<commit_message>
added flex nav bar to index
</commit_message>
<xml_diff>
--- a/images/backgrounds/colorPallate.pptx
+++ b/images/backgrounds/colorPallate.pptx
@@ -6,6 +6,7 @@
   </p:sldMasterIdLst>
   <p:sldIdLst>
     <p:sldId id="256" r:id="rId2"/>
+    <p:sldId id="257" r:id="rId3"/>
   </p:sldIdLst>
   <p:sldSz cx="12192000" cy="6858000"/>
   <p:notesSz cx="6858000" cy="9144000"/>
@@ -104,6 +105,11 @@
       </a:defRPr>
     </a:lvl9pPr>
   </p:defaultTextStyle>
+  <p:extLst>
+    <p:ext uri="{EFAFB233-063F-42B5-8137-9DF3F51BA10A}">
+      <p15:sldGuideLst xmlns:p15="http://schemas.microsoft.com/office/powerpoint/2012/main"/>
+    </p:ext>
+  </p:extLst>
 </p:presentation>
 </file>
 
@@ -3447,6 +3453,155 @@
 </p:sld>
 </file>
 
+<file path=ppt/slides/slide2.xml><?xml version="1.0" encoding="utf-8"?>
+<p:sld xmlns:a="http://schemas.openxmlformats.org/drawingml/2006/main" xmlns:r="http://schemas.openxmlformats.org/officeDocument/2006/relationships" xmlns:p="http://schemas.openxmlformats.org/presentationml/2006/main">
+  <p:cSld>
+    <p:bg>
+      <p:bgPr>
+        <a:solidFill>
+          <a:srgbClr val="F3E2D3"/>
+        </a:solidFill>
+        <a:effectLst/>
+      </p:bgPr>
+    </p:bg>
+    <p:spTree>
+      <p:nvGrpSpPr>
+        <p:cNvPr id="1" name=""/>
+        <p:cNvGrpSpPr/>
+        <p:nvPr/>
+      </p:nvGrpSpPr>
+      <p:grpSpPr>
+        <a:xfrm>
+          <a:off x="0" y="0"/>
+          <a:ext cx="0" cy="0"/>
+          <a:chOff x="0" y="0"/>
+          <a:chExt cx="0" cy="0"/>
+        </a:xfrm>
+      </p:grpSpPr>
+      <p:sp>
+        <p:nvSpPr>
+          <p:cNvPr id="2" name="Title 1">
+            <a:extLst>
+              <a:ext uri="{FF2B5EF4-FFF2-40B4-BE49-F238E27FC236}">
+                <a16:creationId xmlns:a16="http://schemas.microsoft.com/office/drawing/2014/main" id="{42499CD2-545D-4640-8B5E-5E68F2AFD9F9}"/>
+              </a:ext>
+            </a:extLst>
+          </p:cNvPr>
+          <p:cNvSpPr>
+            <a:spLocks noGrp="1"/>
+          </p:cNvSpPr>
+          <p:nvPr>
+            <p:ph type="ctrTitle"/>
+          </p:nvPr>
+        </p:nvSpPr>
+        <p:spPr>
+          <a:xfrm>
+            <a:off x="4389120" y="1122363"/>
+            <a:ext cx="3596640" cy="2387600"/>
+          </a:xfrm>
+        </p:spPr>
+        <p:txBody>
+          <a:bodyPr>
+            <a:normAutofit fontScale="90000"/>
+          </a:bodyPr>
+          <a:lstStyle/>
+          <a:p>
+            <a:pPr algn="l"/>
+            <a:r>
+              <a:rPr lang="en-US" dirty="0">
+                <a:solidFill>
+                  <a:srgbClr val="3D8478"/>
+                </a:solidFill>
+                <a:latin typeface="Franklin Gothic Demi" panose="020B0703020102020204" pitchFamily="34" charset="0"/>
+              </a:rPr>
+              <a:t>PRANAV</a:t>
+            </a:r>
+            <a:br>
+              <a:rPr lang="en-US" dirty="0">
+                <a:solidFill>
+                  <a:srgbClr val="3D8478"/>
+                </a:solidFill>
+                <a:latin typeface="Franklin Gothic Demi" panose="020B0703020102020204" pitchFamily="34" charset="0"/>
+              </a:rPr>
+            </a:br>
+            <a:r>
+              <a:rPr lang="en-US" dirty="0">
+                <a:solidFill>
+                  <a:srgbClr val="3D8478"/>
+                </a:solidFill>
+                <a:latin typeface="Franklin Gothic Demi" panose="020B0703020102020204" pitchFamily="34" charset="0"/>
+              </a:rPr>
+              <a:t>PRATAP</a:t>
+            </a:r>
+            <a:br>
+              <a:rPr lang="en-US" dirty="0">
+                <a:solidFill>
+                  <a:srgbClr val="3D8478"/>
+                </a:solidFill>
+                <a:latin typeface="Franklin Gothic Demi" panose="020B0703020102020204" pitchFamily="34" charset="0"/>
+              </a:rPr>
+            </a:br>
+            <a:r>
+              <a:rPr lang="en-US" dirty="0">
+                <a:solidFill>
+                  <a:srgbClr val="3D8478"/>
+                </a:solidFill>
+                <a:latin typeface="Franklin Gothic Demi" panose="020B0703020102020204" pitchFamily="34" charset="0"/>
+              </a:rPr>
+              <a:t>VAISH</a:t>
+            </a:r>
+          </a:p>
+        </p:txBody>
+      </p:sp>
+      <p:pic>
+        <p:nvPicPr>
+          <p:cNvPr id="5" name="Picture 4">
+            <a:extLst>
+              <a:ext uri="{FF2B5EF4-FFF2-40B4-BE49-F238E27FC236}">
+                <a16:creationId xmlns:a16="http://schemas.microsoft.com/office/drawing/2014/main" id="{8313CEFD-B8E1-4BDA-AA87-16C8D9B228F6}"/>
+              </a:ext>
+            </a:extLst>
+          </p:cNvPr>
+          <p:cNvPicPr>
+            <a:picLocks noChangeAspect="1"/>
+          </p:cNvPicPr>
+          <p:nvPr/>
+        </p:nvPicPr>
+        <p:blipFill>
+          <a:blip r:embed="rId2">
+            <a:extLst>
+              <a:ext uri="{28A0092B-C50C-407E-A947-70E740481C1C}">
+                <a14:useLocalDpi xmlns:a14="http://schemas.microsoft.com/office/drawing/2010/main" val="0"/>
+              </a:ext>
+            </a:extLst>
+          </a:blip>
+          <a:stretch>
+            <a:fillRect/>
+          </a:stretch>
+        </p:blipFill>
+        <p:spPr>
+          <a:xfrm>
+            <a:off x="1524000" y="0"/>
+            <a:ext cx="9144000" cy="6858000"/>
+          </a:xfrm>
+          <a:prstGeom prst="rect">
+            <a:avLst/>
+          </a:prstGeom>
+        </p:spPr>
+      </p:pic>
+    </p:spTree>
+    <p:extLst>
+      <p:ext uri="{BB962C8B-B14F-4D97-AF65-F5344CB8AC3E}">
+        <p14:creationId xmlns:p14="http://schemas.microsoft.com/office/powerpoint/2010/main" val="3914795786"/>
+      </p:ext>
+    </p:extLst>
+  </p:cSld>
+  <p:clrMapOvr>
+    <a:masterClrMapping/>
+  </p:clrMapOvr>
+</p:sld>
+</file>
+
 <file path=ppt/theme/theme1.xml><?xml version="1.0" encoding="utf-8"?>
 <a:theme xmlns:a="http://schemas.openxmlformats.org/drawingml/2006/main" name="Office Theme">
   <a:themeElements>

</xml_diff>

<commit_message>
update home, need other pages to reflect changes
</commit_message>
<xml_diff>
--- a/images/backgrounds/colorPallate.pptx
+++ b/images/backgrounds/colorPallate.pptx
@@ -7,6 +7,12 @@
   <p:sldIdLst>
     <p:sldId id="256" r:id="rId2"/>
     <p:sldId id="257" r:id="rId3"/>
+    <p:sldId id="258" r:id="rId4"/>
+    <p:sldId id="259" r:id="rId5"/>
+    <p:sldId id="262" r:id="rId6"/>
+    <p:sldId id="260" r:id="rId7"/>
+    <p:sldId id="261" r:id="rId8"/>
+    <p:sldId id="263" r:id="rId9"/>
   </p:sldIdLst>
   <p:sldSz cx="12192000" cy="6858000"/>
   <p:notesSz cx="6858000" cy="9144000"/>
@@ -260,7 +266,7 @@
           <a:p>
             <a:fld id="{9D53826D-9D04-4CF2-939D-966E578913EF}" type="datetimeFigureOut">
               <a:rPr lang="en-US" smtClean="0"/>
-              <a:t>5/29/2019</a:t>
+              <a:t>12/16/19</a:t>
             </a:fld>
             <a:endParaRPr lang="en-US"/>
           </a:p>
@@ -458,7 +464,7 @@
           <a:p>
             <a:fld id="{9D53826D-9D04-4CF2-939D-966E578913EF}" type="datetimeFigureOut">
               <a:rPr lang="en-US" smtClean="0"/>
-              <a:t>5/29/2019</a:t>
+              <a:t>12/16/19</a:t>
             </a:fld>
             <a:endParaRPr lang="en-US"/>
           </a:p>
@@ -666,7 +672,7 @@
           <a:p>
             <a:fld id="{9D53826D-9D04-4CF2-939D-966E578913EF}" type="datetimeFigureOut">
               <a:rPr lang="en-US" smtClean="0"/>
-              <a:t>5/29/2019</a:t>
+              <a:t>12/16/19</a:t>
             </a:fld>
             <a:endParaRPr lang="en-US"/>
           </a:p>
@@ -864,7 +870,7 @@
           <a:p>
             <a:fld id="{9D53826D-9D04-4CF2-939D-966E578913EF}" type="datetimeFigureOut">
               <a:rPr lang="en-US" smtClean="0"/>
-              <a:t>5/29/2019</a:t>
+              <a:t>12/16/19</a:t>
             </a:fld>
             <a:endParaRPr lang="en-US"/>
           </a:p>
@@ -1139,7 +1145,7 @@
           <a:p>
             <a:fld id="{9D53826D-9D04-4CF2-939D-966E578913EF}" type="datetimeFigureOut">
               <a:rPr lang="en-US" smtClean="0"/>
-              <a:t>5/29/2019</a:t>
+              <a:t>12/16/19</a:t>
             </a:fld>
             <a:endParaRPr lang="en-US"/>
           </a:p>
@@ -1404,7 +1410,7 @@
           <a:p>
             <a:fld id="{9D53826D-9D04-4CF2-939D-966E578913EF}" type="datetimeFigureOut">
               <a:rPr lang="en-US" smtClean="0"/>
-              <a:t>5/29/2019</a:t>
+              <a:t>12/16/19</a:t>
             </a:fld>
             <a:endParaRPr lang="en-US"/>
           </a:p>
@@ -1816,7 +1822,7 @@
           <a:p>
             <a:fld id="{9D53826D-9D04-4CF2-939D-966E578913EF}" type="datetimeFigureOut">
               <a:rPr lang="en-US" smtClean="0"/>
-              <a:t>5/29/2019</a:t>
+              <a:t>12/16/19</a:t>
             </a:fld>
             <a:endParaRPr lang="en-US"/>
           </a:p>
@@ -1957,7 +1963,7 @@
           <a:p>
             <a:fld id="{9D53826D-9D04-4CF2-939D-966E578913EF}" type="datetimeFigureOut">
               <a:rPr lang="en-US" smtClean="0"/>
-              <a:t>5/29/2019</a:t>
+              <a:t>12/16/19</a:t>
             </a:fld>
             <a:endParaRPr lang="en-US"/>
           </a:p>
@@ -2070,7 +2076,7 @@
           <a:p>
             <a:fld id="{9D53826D-9D04-4CF2-939D-966E578913EF}" type="datetimeFigureOut">
               <a:rPr lang="en-US" smtClean="0"/>
-              <a:t>5/29/2019</a:t>
+              <a:t>12/16/19</a:t>
             </a:fld>
             <a:endParaRPr lang="en-US"/>
           </a:p>
@@ -2381,7 +2387,7 @@
           <a:p>
             <a:fld id="{9D53826D-9D04-4CF2-939D-966E578913EF}" type="datetimeFigureOut">
               <a:rPr lang="en-US" smtClean="0"/>
-              <a:t>5/29/2019</a:t>
+              <a:t>12/16/19</a:t>
             </a:fld>
             <a:endParaRPr lang="en-US"/>
           </a:p>
@@ -2669,7 +2675,7 @@
           <a:p>
             <a:fld id="{9D53826D-9D04-4CF2-939D-966E578913EF}" type="datetimeFigureOut">
               <a:rPr lang="en-US" smtClean="0"/>
-              <a:t>5/29/2019</a:t>
+              <a:t>12/16/19</a:t>
             </a:fld>
             <a:endParaRPr lang="en-US"/>
           </a:p>
@@ -2910,7 +2916,7 @@
           <a:p>
             <a:fld id="{9D53826D-9D04-4CF2-939D-966E578913EF}" type="datetimeFigureOut">
               <a:rPr lang="en-US" smtClean="0"/>
-              <a:t>5/29/2019</a:t>
+              <a:t>12/16/19</a:t>
             </a:fld>
             <a:endParaRPr lang="en-US"/>
           </a:p>
@@ -3602,6 +3608,2365 @@
 </p:sld>
 </file>
 
+<file path=ppt/slides/slide3.xml><?xml version="1.0" encoding="utf-8"?>
+<p:sld xmlns:a="http://schemas.openxmlformats.org/drawingml/2006/main" xmlns:r="http://schemas.openxmlformats.org/officeDocument/2006/relationships" xmlns:p="http://schemas.openxmlformats.org/presentationml/2006/main">
+  <p:cSld>
+    <p:bg>
+      <p:bgPr>
+        <a:solidFill>
+          <a:srgbClr val="F3E2D3"/>
+        </a:solidFill>
+        <a:effectLst/>
+      </p:bgPr>
+    </p:bg>
+    <p:spTree>
+      <p:nvGrpSpPr>
+        <p:cNvPr id="1" name=""/>
+        <p:cNvGrpSpPr/>
+        <p:nvPr/>
+      </p:nvGrpSpPr>
+      <p:grpSpPr>
+        <a:xfrm>
+          <a:off x="0" y="0"/>
+          <a:ext cx="0" cy="0"/>
+          <a:chOff x="0" y="0"/>
+          <a:chExt cx="0" cy="0"/>
+        </a:xfrm>
+      </p:grpSpPr>
+      <p:pic>
+        <p:nvPicPr>
+          <p:cNvPr id="3" name="Picture 2">
+            <a:extLst>
+              <a:ext uri="{FF2B5EF4-FFF2-40B4-BE49-F238E27FC236}">
+                <a16:creationId xmlns:a16="http://schemas.microsoft.com/office/drawing/2014/main" id="{F2F39EF2-BE63-A248-A27A-0D649CE04AA9}"/>
+              </a:ext>
+            </a:extLst>
+          </p:cNvPr>
+          <p:cNvPicPr>
+            <a:picLocks noChangeAspect="1"/>
+          </p:cNvPicPr>
+          <p:nvPr/>
+        </p:nvPicPr>
+        <p:blipFill>
+          <a:blip r:embed="rId2"/>
+          <a:stretch>
+            <a:fillRect/>
+          </a:stretch>
+        </p:blipFill>
+        <p:spPr>
+          <a:xfrm>
+            <a:off x="0" y="6826347"/>
+            <a:ext cx="12192000" cy="4103923"/>
+          </a:xfrm>
+          <a:prstGeom prst="rect">
+            <a:avLst/>
+          </a:prstGeom>
+        </p:spPr>
+      </p:pic>
+      <p:sp>
+        <p:nvSpPr>
+          <p:cNvPr id="2" name="Title 1">
+            <a:extLst>
+              <a:ext uri="{FF2B5EF4-FFF2-40B4-BE49-F238E27FC236}">
+                <a16:creationId xmlns:a16="http://schemas.microsoft.com/office/drawing/2014/main" id="{42499CD2-545D-4640-8B5E-5E68F2AFD9F9}"/>
+              </a:ext>
+            </a:extLst>
+          </p:cNvPr>
+          <p:cNvSpPr>
+            <a:spLocks noGrp="1"/>
+          </p:cNvSpPr>
+          <p:nvPr>
+            <p:ph type="ctrTitle"/>
+          </p:nvPr>
+        </p:nvSpPr>
+        <p:spPr>
+          <a:xfrm>
+            <a:off x="4389120" y="1122363"/>
+            <a:ext cx="3596640" cy="2387600"/>
+          </a:xfrm>
+        </p:spPr>
+        <p:txBody>
+          <a:bodyPr>
+            <a:normAutofit fontScale="90000"/>
+          </a:bodyPr>
+          <a:lstStyle/>
+          <a:p>
+            <a:pPr algn="l"/>
+            <a:r>
+              <a:rPr lang="en-US" dirty="0">
+                <a:solidFill>
+                  <a:srgbClr val="3D8478"/>
+                </a:solidFill>
+                <a:latin typeface="Franklin Gothic Demi" panose="020B0703020102020204" pitchFamily="34" charset="0"/>
+              </a:rPr>
+              <a:t>PRANAV</a:t>
+            </a:r>
+            <a:br>
+              <a:rPr lang="en-US" dirty="0">
+                <a:solidFill>
+                  <a:srgbClr val="3D8478"/>
+                </a:solidFill>
+                <a:latin typeface="Franklin Gothic Demi" panose="020B0703020102020204" pitchFamily="34" charset="0"/>
+              </a:rPr>
+            </a:br>
+            <a:r>
+              <a:rPr lang="en-US" dirty="0">
+                <a:solidFill>
+                  <a:srgbClr val="3D8478"/>
+                </a:solidFill>
+                <a:latin typeface="Franklin Gothic Demi" panose="020B0703020102020204" pitchFamily="34" charset="0"/>
+              </a:rPr>
+              <a:t>PRATAP</a:t>
+            </a:r>
+            <a:br>
+              <a:rPr lang="en-US" dirty="0">
+                <a:solidFill>
+                  <a:srgbClr val="3D8478"/>
+                </a:solidFill>
+                <a:latin typeface="Franklin Gothic Demi" panose="020B0703020102020204" pitchFamily="34" charset="0"/>
+              </a:rPr>
+            </a:br>
+            <a:r>
+              <a:rPr lang="en-US" dirty="0">
+                <a:solidFill>
+                  <a:srgbClr val="3D8478"/>
+                </a:solidFill>
+                <a:latin typeface="Franklin Gothic Demi" panose="020B0703020102020204" pitchFamily="34" charset="0"/>
+              </a:rPr>
+              <a:t>VAISH</a:t>
+            </a:r>
+          </a:p>
+        </p:txBody>
+      </p:sp>
+      <p:pic>
+        <p:nvPicPr>
+          <p:cNvPr id="5" name="Picture 4">
+            <a:extLst>
+              <a:ext uri="{FF2B5EF4-FFF2-40B4-BE49-F238E27FC236}">
+                <a16:creationId xmlns:a16="http://schemas.microsoft.com/office/drawing/2014/main" id="{8313CEFD-B8E1-4BDA-AA87-16C8D9B228F6}"/>
+              </a:ext>
+            </a:extLst>
+          </p:cNvPr>
+          <p:cNvPicPr>
+            <a:picLocks noChangeAspect="1"/>
+          </p:cNvPicPr>
+          <p:nvPr/>
+        </p:nvPicPr>
+        <p:blipFill rotWithShape="1">
+          <a:blip r:embed="rId3">
+            <a:extLst>
+              <a:ext uri="{28A0092B-C50C-407E-A947-70E740481C1C}">
+                <a14:useLocalDpi xmlns:a14="http://schemas.microsoft.com/office/drawing/2010/main" val="0"/>
+              </a:ext>
+            </a:extLst>
+          </a:blip>
+          <a:srcRect t="11282" b="6257"/>
+          <a:stretch/>
+        </p:blipFill>
+        <p:spPr>
+          <a:xfrm>
+            <a:off x="0" y="0"/>
+            <a:ext cx="12192000" cy="7540284"/>
+          </a:xfrm>
+          <a:prstGeom prst="rect">
+            <a:avLst/>
+          </a:prstGeom>
+        </p:spPr>
+      </p:pic>
+      <p:sp>
+        <p:nvSpPr>
+          <p:cNvPr id="6" name="Title 1">
+            <a:extLst>
+              <a:ext uri="{FF2B5EF4-FFF2-40B4-BE49-F238E27FC236}">
+                <a16:creationId xmlns:a16="http://schemas.microsoft.com/office/drawing/2014/main" id="{B72C96C0-0346-C442-8A78-66C1D10474C3}"/>
+              </a:ext>
+            </a:extLst>
+          </p:cNvPr>
+          <p:cNvSpPr txBox="1">
+            <a:spLocks/>
+          </p:cNvSpPr>
+          <p:nvPr/>
+        </p:nvSpPr>
+        <p:spPr>
+          <a:xfrm>
+            <a:off x="4389120" y="2143558"/>
+            <a:ext cx="3596640" cy="2387600"/>
+          </a:xfrm>
+          <a:prstGeom prst="rect">
+            <a:avLst/>
+          </a:prstGeom>
+        </p:spPr>
+        <p:txBody>
+          <a:bodyPr vert="horz" lIns="91440" tIns="45720" rIns="91440" bIns="45720" rtlCol="0" anchor="b">
+            <a:normAutofit fontScale="97500" lnSpcReduction="10000"/>
+          </a:bodyPr>
+          <a:lstStyle>
+            <a:lvl1pPr algn="ctr" defTabSz="914400" rtl="0" eaLnBrk="1" latinLnBrk="0" hangingPunct="1">
+              <a:lnSpc>
+                <a:spcPct val="90000"/>
+              </a:lnSpc>
+              <a:spcBef>
+                <a:spcPct val="0"/>
+              </a:spcBef>
+              <a:buNone/>
+              <a:defRPr sz="6000" kern="1200">
+                <a:solidFill>
+                  <a:schemeClr val="tx1"/>
+                </a:solidFill>
+                <a:latin typeface="+mj-lt"/>
+                <a:ea typeface="+mj-ea"/>
+                <a:cs typeface="+mj-cs"/>
+              </a:defRPr>
+            </a:lvl1pPr>
+          </a:lstStyle>
+          <a:p>
+            <a:pPr algn="l"/>
+            <a:r>
+              <a:rPr lang="en-US" dirty="0">
+                <a:latin typeface="Franklin Gothic Demi" panose="020B0703020102020204" pitchFamily="34" charset="0"/>
+              </a:rPr>
+              <a:t>PRANAV</a:t>
+            </a:r>
+            <a:br>
+              <a:rPr lang="en-US" dirty="0">
+                <a:latin typeface="Franklin Gothic Demi" panose="020B0703020102020204" pitchFamily="34" charset="0"/>
+              </a:rPr>
+            </a:br>
+            <a:r>
+              <a:rPr lang="en-US" dirty="0">
+                <a:latin typeface="Franklin Gothic Demi" panose="020B0703020102020204" pitchFamily="34" charset="0"/>
+              </a:rPr>
+              <a:t>PRATAP</a:t>
+            </a:r>
+            <a:br>
+              <a:rPr lang="en-US" dirty="0">
+                <a:latin typeface="Franklin Gothic Demi" panose="020B0703020102020204" pitchFamily="34" charset="0"/>
+              </a:rPr>
+            </a:br>
+            <a:r>
+              <a:rPr lang="en-US" dirty="0">
+                <a:latin typeface="Franklin Gothic Demi" panose="020B0703020102020204" pitchFamily="34" charset="0"/>
+              </a:rPr>
+              <a:t>VAISH</a:t>
+            </a:r>
+          </a:p>
+        </p:txBody>
+      </p:sp>
+      <p:sp>
+        <p:nvSpPr>
+          <p:cNvPr id="7" name="Title 1">
+            <a:extLst>
+              <a:ext uri="{FF2B5EF4-FFF2-40B4-BE49-F238E27FC236}">
+                <a16:creationId xmlns:a16="http://schemas.microsoft.com/office/drawing/2014/main" id="{245D0490-E0D0-1045-9729-4666A14CD0B6}"/>
+              </a:ext>
+            </a:extLst>
+          </p:cNvPr>
+          <p:cNvSpPr txBox="1">
+            <a:spLocks/>
+          </p:cNvSpPr>
+          <p:nvPr/>
+        </p:nvSpPr>
+        <p:spPr>
+          <a:xfrm>
+            <a:off x="760949" y="8133733"/>
+            <a:ext cx="2423686" cy="1110593"/>
+          </a:xfrm>
+          <a:prstGeom prst="rect">
+            <a:avLst/>
+          </a:prstGeom>
+        </p:spPr>
+        <p:txBody>
+          <a:bodyPr vert="horz" lIns="91440" tIns="45720" rIns="91440" bIns="45720" rtlCol="0" anchor="ctr">
+            <a:normAutofit fontScale="97500"/>
+          </a:bodyPr>
+          <a:lstStyle>
+            <a:lvl1pPr algn="ctr" defTabSz="914400" rtl="0" eaLnBrk="1" latinLnBrk="0" hangingPunct="1">
+              <a:lnSpc>
+                <a:spcPct val="90000"/>
+              </a:lnSpc>
+              <a:spcBef>
+                <a:spcPct val="0"/>
+              </a:spcBef>
+              <a:buNone/>
+              <a:defRPr sz="6000" kern="1200">
+                <a:solidFill>
+                  <a:schemeClr val="tx1"/>
+                </a:solidFill>
+                <a:latin typeface="+mj-lt"/>
+                <a:ea typeface="+mj-ea"/>
+                <a:cs typeface="+mj-cs"/>
+              </a:defRPr>
+            </a:lvl1pPr>
+          </a:lstStyle>
+          <a:p>
+            <a:r>
+              <a:rPr lang="en-US" dirty="0">
+                <a:latin typeface="Franklin Gothic Demi" panose="020B0703020102020204" pitchFamily="34" charset="0"/>
+              </a:rPr>
+              <a:t>about</a:t>
+            </a:r>
+          </a:p>
+        </p:txBody>
+      </p:sp>
+      <p:sp>
+        <p:nvSpPr>
+          <p:cNvPr id="8" name="Title 1">
+            <a:extLst>
+              <a:ext uri="{FF2B5EF4-FFF2-40B4-BE49-F238E27FC236}">
+                <a16:creationId xmlns:a16="http://schemas.microsoft.com/office/drawing/2014/main" id="{B2A03E50-21CF-3E43-B333-75C6B943C56F}"/>
+              </a:ext>
+            </a:extLst>
+          </p:cNvPr>
+          <p:cNvSpPr txBox="1">
+            <a:spLocks/>
+          </p:cNvSpPr>
+          <p:nvPr/>
+        </p:nvSpPr>
+        <p:spPr>
+          <a:xfrm>
+            <a:off x="4947219" y="8131430"/>
+            <a:ext cx="2423686" cy="1110593"/>
+          </a:xfrm>
+          <a:prstGeom prst="rect">
+            <a:avLst/>
+          </a:prstGeom>
+        </p:spPr>
+        <p:txBody>
+          <a:bodyPr vert="horz" lIns="91440" tIns="45720" rIns="91440" bIns="45720" rtlCol="0" anchor="ctr">
+            <a:normAutofit fontScale="97500"/>
+          </a:bodyPr>
+          <a:lstStyle>
+            <a:lvl1pPr algn="ctr" defTabSz="914400" rtl="0" eaLnBrk="1" latinLnBrk="0" hangingPunct="1">
+              <a:lnSpc>
+                <a:spcPct val="90000"/>
+              </a:lnSpc>
+              <a:spcBef>
+                <a:spcPct val="0"/>
+              </a:spcBef>
+              <a:buNone/>
+              <a:defRPr sz="6000" kern="1200">
+                <a:solidFill>
+                  <a:schemeClr val="tx1"/>
+                </a:solidFill>
+                <a:latin typeface="+mj-lt"/>
+                <a:ea typeface="+mj-ea"/>
+                <a:cs typeface="+mj-cs"/>
+              </a:defRPr>
+            </a:lvl1pPr>
+          </a:lstStyle>
+          <a:p>
+            <a:r>
+              <a:rPr lang="en-US" dirty="0">
+                <a:latin typeface="Franklin Gothic Demi" panose="020B0703020102020204" pitchFamily="34" charset="0"/>
+              </a:rPr>
+              <a:t>gallery</a:t>
+            </a:r>
+          </a:p>
+        </p:txBody>
+      </p:sp>
+      <p:sp>
+        <p:nvSpPr>
+          <p:cNvPr id="9" name="Title 1">
+            <a:extLst>
+              <a:ext uri="{FF2B5EF4-FFF2-40B4-BE49-F238E27FC236}">
+                <a16:creationId xmlns:a16="http://schemas.microsoft.com/office/drawing/2014/main" id="{8E1543EC-CB19-3B48-9A1A-0BBDEB138F40}"/>
+              </a:ext>
+            </a:extLst>
+          </p:cNvPr>
+          <p:cNvSpPr txBox="1">
+            <a:spLocks/>
+          </p:cNvSpPr>
+          <p:nvPr/>
+        </p:nvSpPr>
+        <p:spPr>
+          <a:xfrm>
+            <a:off x="9133489" y="8133733"/>
+            <a:ext cx="2791022" cy="1110593"/>
+          </a:xfrm>
+          <a:prstGeom prst="rect">
+            <a:avLst/>
+          </a:prstGeom>
+        </p:spPr>
+        <p:txBody>
+          <a:bodyPr vert="horz" lIns="91440" tIns="45720" rIns="91440" bIns="45720" rtlCol="0" anchor="ctr">
+            <a:normAutofit fontScale="97500"/>
+          </a:bodyPr>
+          <a:lstStyle>
+            <a:lvl1pPr algn="ctr" defTabSz="914400" rtl="0" eaLnBrk="1" latinLnBrk="0" hangingPunct="1">
+              <a:lnSpc>
+                <a:spcPct val="90000"/>
+              </a:lnSpc>
+              <a:spcBef>
+                <a:spcPct val="0"/>
+              </a:spcBef>
+              <a:buNone/>
+              <a:defRPr sz="6000" kern="1200">
+                <a:solidFill>
+                  <a:schemeClr val="tx1"/>
+                </a:solidFill>
+                <a:latin typeface="+mj-lt"/>
+                <a:ea typeface="+mj-ea"/>
+                <a:cs typeface="+mj-cs"/>
+              </a:defRPr>
+            </a:lvl1pPr>
+          </a:lstStyle>
+          <a:p>
+            <a:r>
+              <a:rPr lang="en-US" dirty="0">
+                <a:latin typeface="Franklin Gothic Demi" panose="020B0703020102020204" pitchFamily="34" charset="0"/>
+              </a:rPr>
+              <a:t>contact</a:t>
+            </a:r>
+          </a:p>
+        </p:txBody>
+      </p:sp>
+    </p:spTree>
+    <p:extLst>
+      <p:ext uri="{BB962C8B-B14F-4D97-AF65-F5344CB8AC3E}">
+        <p14:creationId xmlns:p14="http://schemas.microsoft.com/office/powerpoint/2010/main" val="3413191839"/>
+      </p:ext>
+    </p:extLst>
+  </p:cSld>
+  <p:clrMapOvr>
+    <a:masterClrMapping/>
+  </p:clrMapOvr>
+</p:sld>
+</file>
+
+<file path=ppt/slides/slide4.xml><?xml version="1.0" encoding="utf-8"?>
+<p:sld xmlns:a="http://schemas.openxmlformats.org/drawingml/2006/main" xmlns:r="http://schemas.openxmlformats.org/officeDocument/2006/relationships" xmlns:p="http://schemas.openxmlformats.org/presentationml/2006/main">
+  <p:cSld>
+    <p:bg>
+      <p:bgPr>
+        <a:solidFill>
+          <a:srgbClr val="F3E2D3"/>
+        </a:solidFill>
+        <a:effectLst/>
+      </p:bgPr>
+    </p:bg>
+    <p:spTree>
+      <p:nvGrpSpPr>
+        <p:cNvPr id="1" name=""/>
+        <p:cNvGrpSpPr/>
+        <p:nvPr/>
+      </p:nvGrpSpPr>
+      <p:grpSpPr>
+        <a:xfrm>
+          <a:off x="0" y="0"/>
+          <a:ext cx="0" cy="0"/>
+          <a:chOff x="0" y="0"/>
+          <a:chExt cx="0" cy="0"/>
+        </a:xfrm>
+      </p:grpSpPr>
+      <p:pic>
+        <p:nvPicPr>
+          <p:cNvPr id="3" name="Picture 2">
+            <a:extLst>
+              <a:ext uri="{FF2B5EF4-FFF2-40B4-BE49-F238E27FC236}">
+                <a16:creationId xmlns:a16="http://schemas.microsoft.com/office/drawing/2014/main" id="{F2F39EF2-BE63-A248-A27A-0D649CE04AA9}"/>
+              </a:ext>
+            </a:extLst>
+          </p:cNvPr>
+          <p:cNvPicPr>
+            <a:picLocks noChangeAspect="1"/>
+          </p:cNvPicPr>
+          <p:nvPr/>
+        </p:nvPicPr>
+        <p:blipFill>
+          <a:blip r:embed="rId2"/>
+          <a:stretch>
+            <a:fillRect/>
+          </a:stretch>
+        </p:blipFill>
+        <p:spPr>
+          <a:xfrm>
+            <a:off x="0" y="6826347"/>
+            <a:ext cx="12192000" cy="4103923"/>
+          </a:xfrm>
+          <a:prstGeom prst="rect">
+            <a:avLst/>
+          </a:prstGeom>
+        </p:spPr>
+      </p:pic>
+      <p:sp>
+        <p:nvSpPr>
+          <p:cNvPr id="2" name="Title 1">
+            <a:extLst>
+              <a:ext uri="{FF2B5EF4-FFF2-40B4-BE49-F238E27FC236}">
+                <a16:creationId xmlns:a16="http://schemas.microsoft.com/office/drawing/2014/main" id="{42499CD2-545D-4640-8B5E-5E68F2AFD9F9}"/>
+              </a:ext>
+            </a:extLst>
+          </p:cNvPr>
+          <p:cNvSpPr>
+            <a:spLocks noGrp="1"/>
+          </p:cNvSpPr>
+          <p:nvPr>
+            <p:ph type="ctrTitle"/>
+          </p:nvPr>
+        </p:nvSpPr>
+        <p:spPr>
+          <a:xfrm>
+            <a:off x="4389120" y="1122363"/>
+            <a:ext cx="3596640" cy="2387600"/>
+          </a:xfrm>
+        </p:spPr>
+        <p:txBody>
+          <a:bodyPr>
+            <a:normAutofit fontScale="90000"/>
+          </a:bodyPr>
+          <a:lstStyle/>
+          <a:p>
+            <a:pPr algn="l"/>
+            <a:r>
+              <a:rPr lang="en-US" dirty="0">
+                <a:solidFill>
+                  <a:srgbClr val="3D8478"/>
+                </a:solidFill>
+                <a:latin typeface="Franklin Gothic Demi" panose="020B0703020102020204" pitchFamily="34" charset="0"/>
+              </a:rPr>
+              <a:t>PRANAV</a:t>
+            </a:r>
+            <a:br>
+              <a:rPr lang="en-US" dirty="0">
+                <a:solidFill>
+                  <a:srgbClr val="3D8478"/>
+                </a:solidFill>
+                <a:latin typeface="Franklin Gothic Demi" panose="020B0703020102020204" pitchFamily="34" charset="0"/>
+              </a:rPr>
+            </a:br>
+            <a:r>
+              <a:rPr lang="en-US" dirty="0">
+                <a:solidFill>
+                  <a:srgbClr val="3D8478"/>
+                </a:solidFill>
+                <a:latin typeface="Franklin Gothic Demi" panose="020B0703020102020204" pitchFamily="34" charset="0"/>
+              </a:rPr>
+              <a:t>PRATAP</a:t>
+            </a:r>
+            <a:br>
+              <a:rPr lang="en-US" dirty="0">
+                <a:solidFill>
+                  <a:srgbClr val="3D8478"/>
+                </a:solidFill>
+                <a:latin typeface="Franklin Gothic Demi" panose="020B0703020102020204" pitchFamily="34" charset="0"/>
+              </a:rPr>
+            </a:br>
+            <a:r>
+              <a:rPr lang="en-US" dirty="0">
+                <a:solidFill>
+                  <a:srgbClr val="3D8478"/>
+                </a:solidFill>
+                <a:latin typeface="Franklin Gothic Demi" panose="020B0703020102020204" pitchFamily="34" charset="0"/>
+              </a:rPr>
+              <a:t>VAISH</a:t>
+            </a:r>
+          </a:p>
+        </p:txBody>
+      </p:sp>
+      <p:pic>
+        <p:nvPicPr>
+          <p:cNvPr id="5" name="Picture 4">
+            <a:extLst>
+              <a:ext uri="{FF2B5EF4-FFF2-40B4-BE49-F238E27FC236}">
+                <a16:creationId xmlns:a16="http://schemas.microsoft.com/office/drawing/2014/main" id="{8313CEFD-B8E1-4BDA-AA87-16C8D9B228F6}"/>
+              </a:ext>
+            </a:extLst>
+          </p:cNvPr>
+          <p:cNvPicPr>
+            <a:picLocks noChangeAspect="1"/>
+          </p:cNvPicPr>
+          <p:nvPr/>
+        </p:nvPicPr>
+        <p:blipFill rotWithShape="1">
+          <a:blip r:embed="rId3">
+            <a:extLst>
+              <a:ext uri="{28A0092B-C50C-407E-A947-70E740481C1C}">
+                <a14:useLocalDpi xmlns:a14="http://schemas.microsoft.com/office/drawing/2010/main" val="0"/>
+              </a:ext>
+            </a:extLst>
+          </a:blip>
+          <a:srcRect t="11282" b="6257"/>
+          <a:stretch/>
+        </p:blipFill>
+        <p:spPr>
+          <a:xfrm>
+            <a:off x="1942064" y="1122363"/>
+            <a:ext cx="8307872" cy="5138100"/>
+          </a:xfrm>
+          <a:prstGeom prst="rect">
+            <a:avLst/>
+          </a:prstGeom>
+        </p:spPr>
+      </p:pic>
+      <p:sp>
+        <p:nvSpPr>
+          <p:cNvPr id="6" name="Title 1">
+            <a:extLst>
+              <a:ext uri="{FF2B5EF4-FFF2-40B4-BE49-F238E27FC236}">
+                <a16:creationId xmlns:a16="http://schemas.microsoft.com/office/drawing/2014/main" id="{B72C96C0-0346-C442-8A78-66C1D10474C3}"/>
+              </a:ext>
+            </a:extLst>
+          </p:cNvPr>
+          <p:cNvSpPr txBox="1">
+            <a:spLocks/>
+          </p:cNvSpPr>
+          <p:nvPr/>
+        </p:nvSpPr>
+        <p:spPr>
+          <a:xfrm>
+            <a:off x="4360742" y="2456685"/>
+            <a:ext cx="3596640" cy="2387600"/>
+          </a:xfrm>
+          <a:prstGeom prst="rect">
+            <a:avLst/>
+          </a:prstGeom>
+        </p:spPr>
+        <p:txBody>
+          <a:bodyPr vert="horz" lIns="91440" tIns="45720" rIns="91440" bIns="45720" rtlCol="0" anchor="b">
+            <a:normAutofit fontScale="97500" lnSpcReduction="10000"/>
+          </a:bodyPr>
+          <a:lstStyle>
+            <a:lvl1pPr algn="ctr" defTabSz="914400" rtl="0" eaLnBrk="1" latinLnBrk="0" hangingPunct="1">
+              <a:lnSpc>
+                <a:spcPct val="90000"/>
+              </a:lnSpc>
+              <a:spcBef>
+                <a:spcPct val="0"/>
+              </a:spcBef>
+              <a:buNone/>
+              <a:defRPr sz="6000" kern="1200">
+                <a:solidFill>
+                  <a:schemeClr val="tx1"/>
+                </a:solidFill>
+                <a:latin typeface="+mj-lt"/>
+                <a:ea typeface="+mj-ea"/>
+                <a:cs typeface="+mj-cs"/>
+              </a:defRPr>
+            </a:lvl1pPr>
+          </a:lstStyle>
+          <a:p>
+            <a:r>
+              <a:rPr lang="en-US" dirty="0">
+                <a:latin typeface="Franklin Gothic Demi" panose="020B0703020102020204" pitchFamily="34" charset="0"/>
+              </a:rPr>
+              <a:t>PRANAV</a:t>
+            </a:r>
+            <a:br>
+              <a:rPr lang="en-US" dirty="0">
+                <a:latin typeface="Franklin Gothic Demi" panose="020B0703020102020204" pitchFamily="34" charset="0"/>
+              </a:rPr>
+            </a:br>
+            <a:r>
+              <a:rPr lang="en-US" dirty="0">
+                <a:latin typeface="Franklin Gothic Demi" panose="020B0703020102020204" pitchFamily="34" charset="0"/>
+              </a:rPr>
+              <a:t>PRATAP</a:t>
+            </a:r>
+            <a:br>
+              <a:rPr lang="en-US" dirty="0">
+                <a:latin typeface="Franklin Gothic Demi" panose="020B0703020102020204" pitchFamily="34" charset="0"/>
+              </a:rPr>
+            </a:br>
+            <a:r>
+              <a:rPr lang="en-US" dirty="0">
+                <a:latin typeface="Franklin Gothic Demi" panose="020B0703020102020204" pitchFamily="34" charset="0"/>
+              </a:rPr>
+              <a:t>VAISH</a:t>
+            </a:r>
+          </a:p>
+        </p:txBody>
+      </p:sp>
+      <p:sp>
+        <p:nvSpPr>
+          <p:cNvPr id="7" name="Title 1">
+            <a:extLst>
+              <a:ext uri="{FF2B5EF4-FFF2-40B4-BE49-F238E27FC236}">
+                <a16:creationId xmlns:a16="http://schemas.microsoft.com/office/drawing/2014/main" id="{245D0490-E0D0-1045-9729-4666A14CD0B6}"/>
+              </a:ext>
+            </a:extLst>
+          </p:cNvPr>
+          <p:cNvSpPr txBox="1">
+            <a:spLocks/>
+          </p:cNvSpPr>
+          <p:nvPr/>
+        </p:nvSpPr>
+        <p:spPr>
+          <a:xfrm>
+            <a:off x="760949" y="8133733"/>
+            <a:ext cx="2423686" cy="1110593"/>
+          </a:xfrm>
+          <a:prstGeom prst="rect">
+            <a:avLst/>
+          </a:prstGeom>
+        </p:spPr>
+        <p:txBody>
+          <a:bodyPr vert="horz" lIns="91440" tIns="45720" rIns="91440" bIns="45720" rtlCol="0" anchor="ctr">
+            <a:normAutofit fontScale="97500"/>
+          </a:bodyPr>
+          <a:lstStyle>
+            <a:lvl1pPr algn="ctr" defTabSz="914400" rtl="0" eaLnBrk="1" latinLnBrk="0" hangingPunct="1">
+              <a:lnSpc>
+                <a:spcPct val="90000"/>
+              </a:lnSpc>
+              <a:spcBef>
+                <a:spcPct val="0"/>
+              </a:spcBef>
+              <a:buNone/>
+              <a:defRPr sz="6000" kern="1200">
+                <a:solidFill>
+                  <a:schemeClr val="tx1"/>
+                </a:solidFill>
+                <a:latin typeface="+mj-lt"/>
+                <a:ea typeface="+mj-ea"/>
+                <a:cs typeface="+mj-cs"/>
+              </a:defRPr>
+            </a:lvl1pPr>
+          </a:lstStyle>
+          <a:p>
+            <a:r>
+              <a:rPr lang="en-US" dirty="0">
+                <a:latin typeface="Franklin Gothic Demi" panose="020B0703020102020204" pitchFamily="34" charset="0"/>
+              </a:rPr>
+              <a:t>about</a:t>
+            </a:r>
+          </a:p>
+        </p:txBody>
+      </p:sp>
+      <p:sp>
+        <p:nvSpPr>
+          <p:cNvPr id="8" name="Title 1">
+            <a:extLst>
+              <a:ext uri="{FF2B5EF4-FFF2-40B4-BE49-F238E27FC236}">
+                <a16:creationId xmlns:a16="http://schemas.microsoft.com/office/drawing/2014/main" id="{B2A03E50-21CF-3E43-B333-75C6B943C56F}"/>
+              </a:ext>
+            </a:extLst>
+          </p:cNvPr>
+          <p:cNvSpPr txBox="1">
+            <a:spLocks/>
+          </p:cNvSpPr>
+          <p:nvPr/>
+        </p:nvSpPr>
+        <p:spPr>
+          <a:xfrm>
+            <a:off x="4947219" y="8131430"/>
+            <a:ext cx="2423686" cy="1110593"/>
+          </a:xfrm>
+          <a:prstGeom prst="rect">
+            <a:avLst/>
+          </a:prstGeom>
+        </p:spPr>
+        <p:txBody>
+          <a:bodyPr vert="horz" lIns="91440" tIns="45720" rIns="91440" bIns="45720" rtlCol="0" anchor="ctr">
+            <a:normAutofit fontScale="97500"/>
+          </a:bodyPr>
+          <a:lstStyle>
+            <a:lvl1pPr algn="ctr" defTabSz="914400" rtl="0" eaLnBrk="1" latinLnBrk="0" hangingPunct="1">
+              <a:lnSpc>
+                <a:spcPct val="90000"/>
+              </a:lnSpc>
+              <a:spcBef>
+                <a:spcPct val="0"/>
+              </a:spcBef>
+              <a:buNone/>
+              <a:defRPr sz="6000" kern="1200">
+                <a:solidFill>
+                  <a:schemeClr val="tx1"/>
+                </a:solidFill>
+                <a:latin typeface="+mj-lt"/>
+                <a:ea typeface="+mj-ea"/>
+                <a:cs typeface="+mj-cs"/>
+              </a:defRPr>
+            </a:lvl1pPr>
+          </a:lstStyle>
+          <a:p>
+            <a:r>
+              <a:rPr lang="en-US" dirty="0">
+                <a:latin typeface="Franklin Gothic Demi" panose="020B0703020102020204" pitchFamily="34" charset="0"/>
+              </a:rPr>
+              <a:t>gallery</a:t>
+            </a:r>
+          </a:p>
+        </p:txBody>
+      </p:sp>
+      <p:sp>
+        <p:nvSpPr>
+          <p:cNvPr id="9" name="Title 1">
+            <a:extLst>
+              <a:ext uri="{FF2B5EF4-FFF2-40B4-BE49-F238E27FC236}">
+                <a16:creationId xmlns:a16="http://schemas.microsoft.com/office/drawing/2014/main" id="{8E1543EC-CB19-3B48-9A1A-0BBDEB138F40}"/>
+              </a:ext>
+            </a:extLst>
+          </p:cNvPr>
+          <p:cNvSpPr txBox="1">
+            <a:spLocks/>
+          </p:cNvSpPr>
+          <p:nvPr/>
+        </p:nvSpPr>
+        <p:spPr>
+          <a:xfrm>
+            <a:off x="9133489" y="8133733"/>
+            <a:ext cx="2791022" cy="1110593"/>
+          </a:xfrm>
+          <a:prstGeom prst="rect">
+            <a:avLst/>
+          </a:prstGeom>
+        </p:spPr>
+        <p:txBody>
+          <a:bodyPr vert="horz" lIns="91440" tIns="45720" rIns="91440" bIns="45720" rtlCol="0" anchor="ctr">
+            <a:normAutofit fontScale="97500"/>
+          </a:bodyPr>
+          <a:lstStyle>
+            <a:lvl1pPr algn="ctr" defTabSz="914400" rtl="0" eaLnBrk="1" latinLnBrk="0" hangingPunct="1">
+              <a:lnSpc>
+                <a:spcPct val="90000"/>
+              </a:lnSpc>
+              <a:spcBef>
+                <a:spcPct val="0"/>
+              </a:spcBef>
+              <a:buNone/>
+              <a:defRPr sz="6000" kern="1200">
+                <a:solidFill>
+                  <a:schemeClr val="tx1"/>
+                </a:solidFill>
+                <a:latin typeface="+mj-lt"/>
+                <a:ea typeface="+mj-ea"/>
+                <a:cs typeface="+mj-cs"/>
+              </a:defRPr>
+            </a:lvl1pPr>
+          </a:lstStyle>
+          <a:p>
+            <a:r>
+              <a:rPr lang="en-US" dirty="0">
+                <a:latin typeface="Franklin Gothic Demi" panose="020B0703020102020204" pitchFamily="34" charset="0"/>
+              </a:rPr>
+              <a:t>contact</a:t>
+            </a:r>
+          </a:p>
+        </p:txBody>
+      </p:sp>
+    </p:spTree>
+    <p:extLst>
+      <p:ext uri="{BB962C8B-B14F-4D97-AF65-F5344CB8AC3E}">
+        <p14:creationId xmlns:p14="http://schemas.microsoft.com/office/powerpoint/2010/main" val="3650701723"/>
+      </p:ext>
+    </p:extLst>
+  </p:cSld>
+  <p:clrMapOvr>
+    <a:masterClrMapping/>
+  </p:clrMapOvr>
+</p:sld>
+</file>
+
+<file path=ppt/slides/slide5.xml><?xml version="1.0" encoding="utf-8"?>
+<p:sld xmlns:a="http://schemas.openxmlformats.org/drawingml/2006/main" xmlns:r="http://schemas.openxmlformats.org/officeDocument/2006/relationships" xmlns:p="http://schemas.openxmlformats.org/presentationml/2006/main">
+  <p:cSld>
+    <p:bg>
+      <p:bgPr>
+        <a:solidFill>
+          <a:srgbClr val="F3E2D3"/>
+        </a:solidFill>
+        <a:effectLst/>
+      </p:bgPr>
+    </p:bg>
+    <p:spTree>
+      <p:nvGrpSpPr>
+        <p:cNvPr id="1" name=""/>
+        <p:cNvGrpSpPr/>
+        <p:nvPr/>
+      </p:nvGrpSpPr>
+      <p:grpSpPr>
+        <a:xfrm>
+          <a:off x="0" y="0"/>
+          <a:ext cx="0" cy="0"/>
+          <a:chOff x="0" y="0"/>
+          <a:chExt cx="0" cy="0"/>
+        </a:xfrm>
+      </p:grpSpPr>
+      <p:pic>
+        <p:nvPicPr>
+          <p:cNvPr id="3" name="Picture 2">
+            <a:extLst>
+              <a:ext uri="{FF2B5EF4-FFF2-40B4-BE49-F238E27FC236}">
+                <a16:creationId xmlns:a16="http://schemas.microsoft.com/office/drawing/2014/main" id="{F2F39EF2-BE63-A248-A27A-0D649CE04AA9}"/>
+              </a:ext>
+            </a:extLst>
+          </p:cNvPr>
+          <p:cNvPicPr>
+            <a:picLocks noChangeAspect="1"/>
+          </p:cNvPicPr>
+          <p:nvPr/>
+        </p:nvPicPr>
+        <p:blipFill>
+          <a:blip r:embed="rId2"/>
+          <a:stretch>
+            <a:fillRect/>
+          </a:stretch>
+        </p:blipFill>
+        <p:spPr>
+          <a:xfrm>
+            <a:off x="0" y="6826347"/>
+            <a:ext cx="12192000" cy="4103923"/>
+          </a:xfrm>
+          <a:prstGeom prst="rect">
+            <a:avLst/>
+          </a:prstGeom>
+        </p:spPr>
+      </p:pic>
+      <p:pic>
+        <p:nvPicPr>
+          <p:cNvPr id="5" name="Picture 4">
+            <a:extLst>
+              <a:ext uri="{FF2B5EF4-FFF2-40B4-BE49-F238E27FC236}">
+                <a16:creationId xmlns:a16="http://schemas.microsoft.com/office/drawing/2014/main" id="{8313CEFD-B8E1-4BDA-AA87-16C8D9B228F6}"/>
+              </a:ext>
+            </a:extLst>
+          </p:cNvPr>
+          <p:cNvPicPr>
+            <a:picLocks noChangeAspect="1"/>
+          </p:cNvPicPr>
+          <p:nvPr/>
+        </p:nvPicPr>
+        <p:blipFill rotWithShape="1">
+          <a:blip r:embed="rId3">
+            <a:extLst>
+              <a:ext uri="{28A0092B-C50C-407E-A947-70E740481C1C}">
+                <a14:useLocalDpi xmlns:a14="http://schemas.microsoft.com/office/drawing/2010/main" val="0"/>
+              </a:ext>
+            </a:extLst>
+          </a:blip>
+          <a:srcRect t="11282" b="6257"/>
+          <a:stretch/>
+        </p:blipFill>
+        <p:spPr>
+          <a:xfrm>
+            <a:off x="0" y="0"/>
+            <a:ext cx="12192000" cy="7540284"/>
+          </a:xfrm>
+          <a:prstGeom prst="rect">
+            <a:avLst/>
+          </a:prstGeom>
+        </p:spPr>
+      </p:pic>
+      <p:pic>
+        <p:nvPicPr>
+          <p:cNvPr id="10" name="Picture 9">
+            <a:extLst>
+              <a:ext uri="{FF2B5EF4-FFF2-40B4-BE49-F238E27FC236}">
+                <a16:creationId xmlns:a16="http://schemas.microsoft.com/office/drawing/2014/main" id="{A2B87C19-A7C9-9146-96CD-90A8022D49BE}"/>
+              </a:ext>
+            </a:extLst>
+          </p:cNvPr>
+          <p:cNvPicPr>
+            <a:picLocks noChangeAspect="1"/>
+          </p:cNvPicPr>
+          <p:nvPr/>
+        </p:nvPicPr>
+        <p:blipFill>
+          <a:blip r:embed="rId2"/>
+          <a:stretch>
+            <a:fillRect/>
+          </a:stretch>
+        </p:blipFill>
+        <p:spPr>
+          <a:xfrm>
+            <a:off x="3393250" y="1"/>
+            <a:ext cx="8798749" cy="1113398"/>
+          </a:xfrm>
+          <a:prstGeom prst="rect">
+            <a:avLst/>
+          </a:prstGeom>
+        </p:spPr>
+      </p:pic>
+      <p:sp>
+        <p:nvSpPr>
+          <p:cNvPr id="6" name="Title 1">
+            <a:extLst>
+              <a:ext uri="{FF2B5EF4-FFF2-40B4-BE49-F238E27FC236}">
+                <a16:creationId xmlns:a16="http://schemas.microsoft.com/office/drawing/2014/main" id="{B72C96C0-0346-C442-8A78-66C1D10474C3}"/>
+              </a:ext>
+            </a:extLst>
+          </p:cNvPr>
+          <p:cNvSpPr txBox="1">
+            <a:spLocks/>
+          </p:cNvSpPr>
+          <p:nvPr/>
+        </p:nvSpPr>
+        <p:spPr>
+          <a:xfrm>
+            <a:off x="0" y="0"/>
+            <a:ext cx="3596640" cy="2387600"/>
+          </a:xfrm>
+          <a:prstGeom prst="rect">
+            <a:avLst/>
+          </a:prstGeom>
+        </p:spPr>
+        <p:txBody>
+          <a:bodyPr vert="horz" lIns="91440" tIns="45720" rIns="91440" bIns="45720" rtlCol="0" anchor="b">
+            <a:normAutofit fontScale="97500" lnSpcReduction="10000"/>
+          </a:bodyPr>
+          <a:lstStyle>
+            <a:lvl1pPr algn="ctr" defTabSz="914400" rtl="0" eaLnBrk="1" latinLnBrk="0" hangingPunct="1">
+              <a:lnSpc>
+                <a:spcPct val="90000"/>
+              </a:lnSpc>
+              <a:spcBef>
+                <a:spcPct val="0"/>
+              </a:spcBef>
+              <a:buNone/>
+              <a:defRPr sz="6000" kern="1200">
+                <a:solidFill>
+                  <a:schemeClr val="tx1"/>
+                </a:solidFill>
+                <a:latin typeface="+mj-lt"/>
+                <a:ea typeface="+mj-ea"/>
+                <a:cs typeface="+mj-cs"/>
+              </a:defRPr>
+            </a:lvl1pPr>
+          </a:lstStyle>
+          <a:p>
+            <a:pPr algn="l"/>
+            <a:r>
+              <a:rPr lang="en-US" dirty="0">
+                <a:latin typeface="Franklin Gothic Demi" panose="020B0703020102020204" pitchFamily="34" charset="0"/>
+              </a:rPr>
+              <a:t>PRANAV</a:t>
+            </a:r>
+            <a:br>
+              <a:rPr lang="en-US" dirty="0">
+                <a:latin typeface="Franklin Gothic Demi" panose="020B0703020102020204" pitchFamily="34" charset="0"/>
+              </a:rPr>
+            </a:br>
+            <a:r>
+              <a:rPr lang="en-US" dirty="0">
+                <a:latin typeface="Franklin Gothic Demi" panose="020B0703020102020204" pitchFamily="34" charset="0"/>
+              </a:rPr>
+              <a:t>PRATAP</a:t>
+            </a:r>
+            <a:br>
+              <a:rPr lang="en-US" dirty="0">
+                <a:latin typeface="Franklin Gothic Demi" panose="020B0703020102020204" pitchFamily="34" charset="0"/>
+              </a:rPr>
+            </a:br>
+            <a:r>
+              <a:rPr lang="en-US" dirty="0">
+                <a:latin typeface="Franklin Gothic Demi" panose="020B0703020102020204" pitchFamily="34" charset="0"/>
+              </a:rPr>
+              <a:t>VAISH</a:t>
+            </a:r>
+          </a:p>
+        </p:txBody>
+      </p:sp>
+      <p:sp>
+        <p:nvSpPr>
+          <p:cNvPr id="7" name="Title 1">
+            <a:extLst>
+              <a:ext uri="{FF2B5EF4-FFF2-40B4-BE49-F238E27FC236}">
+                <a16:creationId xmlns:a16="http://schemas.microsoft.com/office/drawing/2014/main" id="{245D0490-E0D0-1045-9729-4666A14CD0B6}"/>
+              </a:ext>
+            </a:extLst>
+          </p:cNvPr>
+          <p:cNvSpPr txBox="1">
+            <a:spLocks/>
+          </p:cNvSpPr>
+          <p:nvPr/>
+        </p:nvSpPr>
+        <p:spPr>
+          <a:xfrm>
+            <a:off x="3393251" y="-2805"/>
+            <a:ext cx="2423686" cy="1110593"/>
+          </a:xfrm>
+          <a:prstGeom prst="rect">
+            <a:avLst/>
+          </a:prstGeom>
+        </p:spPr>
+        <p:txBody>
+          <a:bodyPr vert="horz" lIns="91440" tIns="45720" rIns="91440" bIns="45720" rtlCol="0" anchor="ctr">
+            <a:normAutofit fontScale="97500"/>
+          </a:bodyPr>
+          <a:lstStyle>
+            <a:lvl1pPr algn="ctr" defTabSz="914400" rtl="0" eaLnBrk="1" latinLnBrk="0" hangingPunct="1">
+              <a:lnSpc>
+                <a:spcPct val="90000"/>
+              </a:lnSpc>
+              <a:spcBef>
+                <a:spcPct val="0"/>
+              </a:spcBef>
+              <a:buNone/>
+              <a:defRPr sz="6000" kern="1200">
+                <a:solidFill>
+                  <a:schemeClr val="tx1"/>
+                </a:solidFill>
+                <a:latin typeface="+mj-lt"/>
+                <a:ea typeface="+mj-ea"/>
+                <a:cs typeface="+mj-cs"/>
+              </a:defRPr>
+            </a:lvl1pPr>
+          </a:lstStyle>
+          <a:p>
+            <a:r>
+              <a:rPr lang="en-US" dirty="0">
+                <a:latin typeface="Franklin Gothic Demi" panose="020B0703020102020204" pitchFamily="34" charset="0"/>
+              </a:rPr>
+              <a:t>about</a:t>
+            </a:r>
+          </a:p>
+        </p:txBody>
+      </p:sp>
+      <p:sp>
+        <p:nvSpPr>
+          <p:cNvPr id="8" name="Title 1">
+            <a:extLst>
+              <a:ext uri="{FF2B5EF4-FFF2-40B4-BE49-F238E27FC236}">
+                <a16:creationId xmlns:a16="http://schemas.microsoft.com/office/drawing/2014/main" id="{B2A03E50-21CF-3E43-B333-75C6B943C56F}"/>
+              </a:ext>
+            </a:extLst>
+          </p:cNvPr>
+          <p:cNvSpPr txBox="1">
+            <a:spLocks/>
+          </p:cNvSpPr>
+          <p:nvPr/>
+        </p:nvSpPr>
+        <p:spPr>
+          <a:xfrm>
+            <a:off x="6341432" y="-5610"/>
+            <a:ext cx="2423686" cy="1110593"/>
+          </a:xfrm>
+          <a:prstGeom prst="rect">
+            <a:avLst/>
+          </a:prstGeom>
+        </p:spPr>
+        <p:txBody>
+          <a:bodyPr vert="horz" lIns="91440" tIns="45720" rIns="91440" bIns="45720" rtlCol="0" anchor="ctr">
+            <a:normAutofit fontScale="97500"/>
+          </a:bodyPr>
+          <a:lstStyle>
+            <a:lvl1pPr algn="ctr" defTabSz="914400" rtl="0" eaLnBrk="1" latinLnBrk="0" hangingPunct="1">
+              <a:lnSpc>
+                <a:spcPct val="90000"/>
+              </a:lnSpc>
+              <a:spcBef>
+                <a:spcPct val="0"/>
+              </a:spcBef>
+              <a:buNone/>
+              <a:defRPr sz="6000" kern="1200">
+                <a:solidFill>
+                  <a:schemeClr val="tx1"/>
+                </a:solidFill>
+                <a:latin typeface="+mj-lt"/>
+                <a:ea typeface="+mj-ea"/>
+                <a:cs typeface="+mj-cs"/>
+              </a:defRPr>
+            </a:lvl1pPr>
+          </a:lstStyle>
+          <a:p>
+            <a:r>
+              <a:rPr lang="en-US" dirty="0">
+                <a:latin typeface="Franklin Gothic Demi" panose="020B0703020102020204" pitchFamily="34" charset="0"/>
+              </a:rPr>
+              <a:t>gallery</a:t>
+            </a:r>
+          </a:p>
+        </p:txBody>
+      </p:sp>
+      <p:sp>
+        <p:nvSpPr>
+          <p:cNvPr id="9" name="Title 1">
+            <a:extLst>
+              <a:ext uri="{FF2B5EF4-FFF2-40B4-BE49-F238E27FC236}">
+                <a16:creationId xmlns:a16="http://schemas.microsoft.com/office/drawing/2014/main" id="{8E1543EC-CB19-3B48-9A1A-0BBDEB138F40}"/>
+              </a:ext>
+            </a:extLst>
+          </p:cNvPr>
+          <p:cNvSpPr txBox="1">
+            <a:spLocks/>
+          </p:cNvSpPr>
+          <p:nvPr/>
+        </p:nvSpPr>
+        <p:spPr>
+          <a:xfrm>
+            <a:off x="9210188" y="0"/>
+            <a:ext cx="2791022" cy="1110593"/>
+          </a:xfrm>
+          <a:prstGeom prst="rect">
+            <a:avLst/>
+          </a:prstGeom>
+        </p:spPr>
+        <p:txBody>
+          <a:bodyPr vert="horz" lIns="91440" tIns="45720" rIns="91440" bIns="45720" rtlCol="0" anchor="ctr">
+            <a:normAutofit fontScale="97500"/>
+          </a:bodyPr>
+          <a:lstStyle>
+            <a:lvl1pPr algn="ctr" defTabSz="914400" rtl="0" eaLnBrk="1" latinLnBrk="0" hangingPunct="1">
+              <a:lnSpc>
+                <a:spcPct val="90000"/>
+              </a:lnSpc>
+              <a:spcBef>
+                <a:spcPct val="0"/>
+              </a:spcBef>
+              <a:buNone/>
+              <a:defRPr sz="6000" kern="1200">
+                <a:solidFill>
+                  <a:schemeClr val="tx1"/>
+                </a:solidFill>
+                <a:latin typeface="+mj-lt"/>
+                <a:ea typeface="+mj-ea"/>
+                <a:cs typeface="+mj-cs"/>
+              </a:defRPr>
+            </a:lvl1pPr>
+          </a:lstStyle>
+          <a:p>
+            <a:r>
+              <a:rPr lang="en-US" dirty="0">
+                <a:latin typeface="Franklin Gothic Demi" panose="020B0703020102020204" pitchFamily="34" charset="0"/>
+              </a:rPr>
+              <a:t>contact</a:t>
+            </a:r>
+          </a:p>
+        </p:txBody>
+      </p:sp>
+    </p:spTree>
+    <p:extLst>
+      <p:ext uri="{BB962C8B-B14F-4D97-AF65-F5344CB8AC3E}">
+        <p14:creationId xmlns:p14="http://schemas.microsoft.com/office/powerpoint/2010/main" val="2177143342"/>
+      </p:ext>
+    </p:extLst>
+  </p:cSld>
+  <p:clrMapOvr>
+    <a:masterClrMapping/>
+  </p:clrMapOvr>
+</p:sld>
+</file>
+
+<file path=ppt/slides/slide6.xml><?xml version="1.0" encoding="utf-8"?>
+<p:sld xmlns:a="http://schemas.openxmlformats.org/drawingml/2006/main" xmlns:r="http://schemas.openxmlformats.org/officeDocument/2006/relationships" xmlns:p="http://schemas.openxmlformats.org/presentationml/2006/main">
+  <p:cSld>
+    <p:bg>
+      <p:bgPr>
+        <a:solidFill>
+          <a:srgbClr val="F3E2D3"/>
+        </a:solidFill>
+        <a:effectLst/>
+      </p:bgPr>
+    </p:bg>
+    <p:spTree>
+      <p:nvGrpSpPr>
+        <p:cNvPr id="1" name=""/>
+        <p:cNvGrpSpPr/>
+        <p:nvPr/>
+      </p:nvGrpSpPr>
+      <p:grpSpPr>
+        <a:xfrm>
+          <a:off x="0" y="0"/>
+          <a:ext cx="0" cy="0"/>
+          <a:chOff x="0" y="0"/>
+          <a:chExt cx="0" cy="0"/>
+        </a:xfrm>
+      </p:grpSpPr>
+      <p:pic>
+        <p:nvPicPr>
+          <p:cNvPr id="3" name="Picture 2">
+            <a:extLst>
+              <a:ext uri="{FF2B5EF4-FFF2-40B4-BE49-F238E27FC236}">
+                <a16:creationId xmlns:a16="http://schemas.microsoft.com/office/drawing/2014/main" id="{F2F39EF2-BE63-A248-A27A-0D649CE04AA9}"/>
+              </a:ext>
+            </a:extLst>
+          </p:cNvPr>
+          <p:cNvPicPr>
+            <a:picLocks noChangeAspect="1"/>
+          </p:cNvPicPr>
+          <p:nvPr/>
+        </p:nvPicPr>
+        <p:blipFill>
+          <a:blip r:embed="rId2"/>
+          <a:stretch>
+            <a:fillRect/>
+          </a:stretch>
+        </p:blipFill>
+        <p:spPr>
+          <a:xfrm>
+            <a:off x="0" y="6826347"/>
+            <a:ext cx="12192000" cy="4103923"/>
+          </a:xfrm>
+          <a:prstGeom prst="rect">
+            <a:avLst/>
+          </a:prstGeom>
+        </p:spPr>
+      </p:pic>
+      <p:pic>
+        <p:nvPicPr>
+          <p:cNvPr id="5" name="Picture 4">
+            <a:extLst>
+              <a:ext uri="{FF2B5EF4-FFF2-40B4-BE49-F238E27FC236}">
+                <a16:creationId xmlns:a16="http://schemas.microsoft.com/office/drawing/2014/main" id="{8313CEFD-B8E1-4BDA-AA87-16C8D9B228F6}"/>
+              </a:ext>
+            </a:extLst>
+          </p:cNvPr>
+          <p:cNvPicPr>
+            <a:picLocks noChangeAspect="1"/>
+          </p:cNvPicPr>
+          <p:nvPr/>
+        </p:nvPicPr>
+        <p:blipFill rotWithShape="1">
+          <a:blip r:embed="rId3">
+            <a:extLst>
+              <a:ext uri="{28A0092B-C50C-407E-A947-70E740481C1C}">
+                <a14:useLocalDpi xmlns:a14="http://schemas.microsoft.com/office/drawing/2010/main" val="0"/>
+              </a:ext>
+            </a:extLst>
+          </a:blip>
+          <a:srcRect t="11282" b="6257"/>
+          <a:stretch/>
+        </p:blipFill>
+        <p:spPr>
+          <a:xfrm>
+            <a:off x="0" y="0"/>
+            <a:ext cx="12192000" cy="7540284"/>
+          </a:xfrm>
+          <a:prstGeom prst="rect">
+            <a:avLst/>
+          </a:prstGeom>
+        </p:spPr>
+      </p:pic>
+      <p:sp>
+        <p:nvSpPr>
+          <p:cNvPr id="6" name="Title 1">
+            <a:extLst>
+              <a:ext uri="{FF2B5EF4-FFF2-40B4-BE49-F238E27FC236}">
+                <a16:creationId xmlns:a16="http://schemas.microsoft.com/office/drawing/2014/main" id="{B72C96C0-0346-C442-8A78-66C1D10474C3}"/>
+              </a:ext>
+            </a:extLst>
+          </p:cNvPr>
+          <p:cNvSpPr txBox="1">
+            <a:spLocks/>
+          </p:cNvSpPr>
+          <p:nvPr/>
+        </p:nvSpPr>
+        <p:spPr>
+          <a:xfrm>
+            <a:off x="0" y="0"/>
+            <a:ext cx="3596640" cy="2387600"/>
+          </a:xfrm>
+          <a:prstGeom prst="rect">
+            <a:avLst/>
+          </a:prstGeom>
+        </p:spPr>
+        <p:txBody>
+          <a:bodyPr vert="horz" lIns="91440" tIns="45720" rIns="91440" bIns="45720" rtlCol="0" anchor="b">
+            <a:normAutofit fontScale="97500" lnSpcReduction="10000"/>
+          </a:bodyPr>
+          <a:lstStyle>
+            <a:lvl1pPr algn="ctr" defTabSz="914400" rtl="0" eaLnBrk="1" latinLnBrk="0" hangingPunct="1">
+              <a:lnSpc>
+                <a:spcPct val="90000"/>
+              </a:lnSpc>
+              <a:spcBef>
+                <a:spcPct val="0"/>
+              </a:spcBef>
+              <a:buNone/>
+              <a:defRPr sz="6000" kern="1200">
+                <a:solidFill>
+                  <a:schemeClr val="tx1"/>
+                </a:solidFill>
+                <a:latin typeface="+mj-lt"/>
+                <a:ea typeface="+mj-ea"/>
+                <a:cs typeface="+mj-cs"/>
+              </a:defRPr>
+            </a:lvl1pPr>
+          </a:lstStyle>
+          <a:p>
+            <a:pPr algn="l"/>
+            <a:r>
+              <a:rPr lang="en-US" dirty="0">
+                <a:solidFill>
+                  <a:schemeClr val="bg1"/>
+                </a:solidFill>
+                <a:latin typeface="Franklin Gothic Demi" panose="020B0703020102020204" pitchFamily="34" charset="0"/>
+              </a:rPr>
+              <a:t>PRANAV</a:t>
+            </a:r>
+            <a:br>
+              <a:rPr lang="en-US" dirty="0">
+                <a:solidFill>
+                  <a:schemeClr val="bg1"/>
+                </a:solidFill>
+                <a:latin typeface="Franklin Gothic Demi" panose="020B0703020102020204" pitchFamily="34" charset="0"/>
+              </a:rPr>
+            </a:br>
+            <a:r>
+              <a:rPr lang="en-US" dirty="0">
+                <a:solidFill>
+                  <a:schemeClr val="bg1"/>
+                </a:solidFill>
+                <a:latin typeface="Franklin Gothic Demi" panose="020B0703020102020204" pitchFamily="34" charset="0"/>
+              </a:rPr>
+              <a:t>PRATAP</a:t>
+            </a:r>
+            <a:br>
+              <a:rPr lang="en-US" dirty="0">
+                <a:solidFill>
+                  <a:schemeClr val="bg1"/>
+                </a:solidFill>
+                <a:latin typeface="Franklin Gothic Demi" panose="020B0703020102020204" pitchFamily="34" charset="0"/>
+              </a:rPr>
+            </a:br>
+            <a:r>
+              <a:rPr lang="en-US" dirty="0">
+                <a:solidFill>
+                  <a:schemeClr val="bg1"/>
+                </a:solidFill>
+                <a:latin typeface="Franklin Gothic Demi" panose="020B0703020102020204" pitchFamily="34" charset="0"/>
+              </a:rPr>
+              <a:t>VAISH</a:t>
+            </a:r>
+          </a:p>
+        </p:txBody>
+      </p:sp>
+      <p:sp>
+        <p:nvSpPr>
+          <p:cNvPr id="7" name="Title 1">
+            <a:extLst>
+              <a:ext uri="{FF2B5EF4-FFF2-40B4-BE49-F238E27FC236}">
+                <a16:creationId xmlns:a16="http://schemas.microsoft.com/office/drawing/2014/main" id="{245D0490-E0D0-1045-9729-4666A14CD0B6}"/>
+              </a:ext>
+            </a:extLst>
+          </p:cNvPr>
+          <p:cNvSpPr txBox="1">
+            <a:spLocks/>
+          </p:cNvSpPr>
+          <p:nvPr/>
+        </p:nvSpPr>
+        <p:spPr>
+          <a:xfrm>
+            <a:off x="3393251" y="-2805"/>
+            <a:ext cx="2423686" cy="1110593"/>
+          </a:xfrm>
+          <a:prstGeom prst="rect">
+            <a:avLst/>
+          </a:prstGeom>
+        </p:spPr>
+        <p:txBody>
+          <a:bodyPr vert="horz" lIns="91440" tIns="45720" rIns="91440" bIns="45720" rtlCol="0" anchor="ctr">
+            <a:normAutofit fontScale="97500"/>
+          </a:bodyPr>
+          <a:lstStyle>
+            <a:lvl1pPr algn="ctr" defTabSz="914400" rtl="0" eaLnBrk="1" latinLnBrk="0" hangingPunct="1">
+              <a:lnSpc>
+                <a:spcPct val="90000"/>
+              </a:lnSpc>
+              <a:spcBef>
+                <a:spcPct val="0"/>
+              </a:spcBef>
+              <a:buNone/>
+              <a:defRPr sz="6000" kern="1200">
+                <a:solidFill>
+                  <a:schemeClr val="tx1"/>
+                </a:solidFill>
+                <a:latin typeface="+mj-lt"/>
+                <a:ea typeface="+mj-ea"/>
+                <a:cs typeface="+mj-cs"/>
+              </a:defRPr>
+            </a:lvl1pPr>
+          </a:lstStyle>
+          <a:p>
+            <a:r>
+              <a:rPr lang="en-US" dirty="0">
+                <a:solidFill>
+                  <a:schemeClr val="bg1"/>
+                </a:solidFill>
+                <a:latin typeface="Franklin Gothic Demi" panose="020B0703020102020204" pitchFamily="34" charset="0"/>
+              </a:rPr>
+              <a:t>about</a:t>
+            </a:r>
+          </a:p>
+        </p:txBody>
+      </p:sp>
+      <p:sp>
+        <p:nvSpPr>
+          <p:cNvPr id="8" name="Title 1">
+            <a:extLst>
+              <a:ext uri="{FF2B5EF4-FFF2-40B4-BE49-F238E27FC236}">
+                <a16:creationId xmlns:a16="http://schemas.microsoft.com/office/drawing/2014/main" id="{B2A03E50-21CF-3E43-B333-75C6B943C56F}"/>
+              </a:ext>
+            </a:extLst>
+          </p:cNvPr>
+          <p:cNvSpPr txBox="1">
+            <a:spLocks/>
+          </p:cNvSpPr>
+          <p:nvPr/>
+        </p:nvSpPr>
+        <p:spPr>
+          <a:xfrm>
+            <a:off x="6341432" y="-5610"/>
+            <a:ext cx="2423686" cy="1110593"/>
+          </a:xfrm>
+          <a:prstGeom prst="rect">
+            <a:avLst/>
+          </a:prstGeom>
+        </p:spPr>
+        <p:txBody>
+          <a:bodyPr vert="horz" lIns="91440" tIns="45720" rIns="91440" bIns="45720" rtlCol="0" anchor="ctr">
+            <a:normAutofit fontScale="97500"/>
+          </a:bodyPr>
+          <a:lstStyle>
+            <a:lvl1pPr algn="ctr" defTabSz="914400" rtl="0" eaLnBrk="1" latinLnBrk="0" hangingPunct="1">
+              <a:lnSpc>
+                <a:spcPct val="90000"/>
+              </a:lnSpc>
+              <a:spcBef>
+                <a:spcPct val="0"/>
+              </a:spcBef>
+              <a:buNone/>
+              <a:defRPr sz="6000" kern="1200">
+                <a:solidFill>
+                  <a:schemeClr val="tx1"/>
+                </a:solidFill>
+                <a:latin typeface="+mj-lt"/>
+                <a:ea typeface="+mj-ea"/>
+                <a:cs typeface="+mj-cs"/>
+              </a:defRPr>
+            </a:lvl1pPr>
+          </a:lstStyle>
+          <a:p>
+            <a:r>
+              <a:rPr lang="en-US" dirty="0">
+                <a:solidFill>
+                  <a:schemeClr val="bg1"/>
+                </a:solidFill>
+                <a:latin typeface="Franklin Gothic Demi" panose="020B0703020102020204" pitchFamily="34" charset="0"/>
+              </a:rPr>
+              <a:t>gallery</a:t>
+            </a:r>
+          </a:p>
+        </p:txBody>
+      </p:sp>
+      <p:sp>
+        <p:nvSpPr>
+          <p:cNvPr id="9" name="Title 1">
+            <a:extLst>
+              <a:ext uri="{FF2B5EF4-FFF2-40B4-BE49-F238E27FC236}">
+                <a16:creationId xmlns:a16="http://schemas.microsoft.com/office/drawing/2014/main" id="{8E1543EC-CB19-3B48-9A1A-0BBDEB138F40}"/>
+              </a:ext>
+            </a:extLst>
+          </p:cNvPr>
+          <p:cNvSpPr txBox="1">
+            <a:spLocks/>
+          </p:cNvSpPr>
+          <p:nvPr/>
+        </p:nvSpPr>
+        <p:spPr>
+          <a:xfrm>
+            <a:off x="9210188" y="0"/>
+            <a:ext cx="2791022" cy="1110593"/>
+          </a:xfrm>
+          <a:prstGeom prst="rect">
+            <a:avLst/>
+          </a:prstGeom>
+        </p:spPr>
+        <p:txBody>
+          <a:bodyPr vert="horz" lIns="91440" tIns="45720" rIns="91440" bIns="45720" rtlCol="0" anchor="ctr">
+            <a:normAutofit fontScale="97500"/>
+          </a:bodyPr>
+          <a:lstStyle>
+            <a:lvl1pPr algn="ctr" defTabSz="914400" rtl="0" eaLnBrk="1" latinLnBrk="0" hangingPunct="1">
+              <a:lnSpc>
+                <a:spcPct val="90000"/>
+              </a:lnSpc>
+              <a:spcBef>
+                <a:spcPct val="0"/>
+              </a:spcBef>
+              <a:buNone/>
+              <a:defRPr sz="6000" kern="1200">
+                <a:solidFill>
+                  <a:schemeClr val="tx1"/>
+                </a:solidFill>
+                <a:latin typeface="+mj-lt"/>
+                <a:ea typeface="+mj-ea"/>
+                <a:cs typeface="+mj-cs"/>
+              </a:defRPr>
+            </a:lvl1pPr>
+          </a:lstStyle>
+          <a:p>
+            <a:r>
+              <a:rPr lang="en-US" dirty="0">
+                <a:solidFill>
+                  <a:schemeClr val="bg1"/>
+                </a:solidFill>
+                <a:latin typeface="Franklin Gothic Demi" panose="020B0703020102020204" pitchFamily="34" charset="0"/>
+              </a:rPr>
+              <a:t>contact</a:t>
+            </a:r>
+          </a:p>
+        </p:txBody>
+      </p:sp>
+    </p:spTree>
+    <p:extLst>
+      <p:ext uri="{BB962C8B-B14F-4D97-AF65-F5344CB8AC3E}">
+        <p14:creationId xmlns:p14="http://schemas.microsoft.com/office/powerpoint/2010/main" val="2927119122"/>
+      </p:ext>
+    </p:extLst>
+  </p:cSld>
+  <p:clrMapOvr>
+    <a:masterClrMapping/>
+  </p:clrMapOvr>
+</p:sld>
+</file>
+
+<file path=ppt/slides/slide7.xml><?xml version="1.0" encoding="utf-8"?>
+<p:sld xmlns:a="http://schemas.openxmlformats.org/drawingml/2006/main" xmlns:r="http://schemas.openxmlformats.org/officeDocument/2006/relationships" xmlns:p="http://schemas.openxmlformats.org/presentationml/2006/main">
+  <p:cSld>
+    <p:bg>
+      <p:bgPr>
+        <a:solidFill>
+          <a:srgbClr val="F3E2D3"/>
+        </a:solidFill>
+        <a:effectLst/>
+      </p:bgPr>
+    </p:bg>
+    <p:spTree>
+      <p:nvGrpSpPr>
+        <p:cNvPr id="1" name=""/>
+        <p:cNvGrpSpPr/>
+        <p:nvPr/>
+      </p:nvGrpSpPr>
+      <p:grpSpPr>
+        <a:xfrm>
+          <a:off x="0" y="0"/>
+          <a:ext cx="0" cy="0"/>
+          <a:chOff x="0" y="0"/>
+          <a:chExt cx="0" cy="0"/>
+        </a:xfrm>
+      </p:grpSpPr>
+      <p:sp>
+        <p:nvSpPr>
+          <p:cNvPr id="2" name="Rectangle 1">
+            <a:extLst>
+              <a:ext uri="{FF2B5EF4-FFF2-40B4-BE49-F238E27FC236}">
+                <a16:creationId xmlns:a16="http://schemas.microsoft.com/office/drawing/2014/main" id="{78EE58B7-24EE-C142-A867-C99C821E00C3}"/>
+              </a:ext>
+            </a:extLst>
+          </p:cNvPr>
+          <p:cNvSpPr/>
+          <p:nvPr/>
+        </p:nvSpPr>
+        <p:spPr>
+          <a:xfrm>
+            <a:off x="0" y="7002936"/>
+            <a:ext cx="12192000" cy="3752193"/>
+          </a:xfrm>
+          <a:prstGeom prst="rect">
+            <a:avLst/>
+          </a:prstGeom>
+        </p:spPr>
+        <p:style>
+          <a:lnRef idx="2">
+            <a:schemeClr val="dk1">
+              <a:shade val="50000"/>
+            </a:schemeClr>
+          </a:lnRef>
+          <a:fillRef idx="1">
+            <a:schemeClr val="dk1"/>
+          </a:fillRef>
+          <a:effectRef idx="0">
+            <a:schemeClr val="dk1"/>
+          </a:effectRef>
+          <a:fontRef idx="minor">
+            <a:schemeClr val="lt1"/>
+          </a:fontRef>
+        </p:style>
+        <p:txBody>
+          <a:bodyPr rtlCol="0" anchor="ctr"/>
+          <a:lstStyle/>
+          <a:p>
+            <a:pPr algn="ctr"/>
+            <a:endParaRPr lang="en-US"/>
+          </a:p>
+        </p:txBody>
+      </p:sp>
+      <p:pic>
+        <p:nvPicPr>
+          <p:cNvPr id="5" name="Picture 4">
+            <a:extLst>
+              <a:ext uri="{FF2B5EF4-FFF2-40B4-BE49-F238E27FC236}">
+                <a16:creationId xmlns:a16="http://schemas.microsoft.com/office/drawing/2014/main" id="{8313CEFD-B8E1-4BDA-AA87-16C8D9B228F6}"/>
+              </a:ext>
+            </a:extLst>
+          </p:cNvPr>
+          <p:cNvPicPr>
+            <a:picLocks noChangeAspect="1"/>
+          </p:cNvPicPr>
+          <p:nvPr/>
+        </p:nvPicPr>
+        <p:blipFill rotWithShape="1">
+          <a:blip r:embed="rId2">
+            <a:extLst>
+              <a:ext uri="{28A0092B-C50C-407E-A947-70E740481C1C}">
+                <a14:useLocalDpi xmlns:a14="http://schemas.microsoft.com/office/drawing/2010/main" val="0"/>
+              </a:ext>
+            </a:extLst>
+          </a:blip>
+          <a:srcRect t="11282" b="6257"/>
+          <a:stretch/>
+        </p:blipFill>
+        <p:spPr>
+          <a:xfrm>
+            <a:off x="0" y="0"/>
+            <a:ext cx="12192000" cy="7540284"/>
+          </a:xfrm>
+          <a:prstGeom prst="rect">
+            <a:avLst/>
+          </a:prstGeom>
+        </p:spPr>
+      </p:pic>
+      <p:sp>
+        <p:nvSpPr>
+          <p:cNvPr id="6" name="Title 1">
+            <a:extLst>
+              <a:ext uri="{FF2B5EF4-FFF2-40B4-BE49-F238E27FC236}">
+                <a16:creationId xmlns:a16="http://schemas.microsoft.com/office/drawing/2014/main" id="{B72C96C0-0346-C442-8A78-66C1D10474C3}"/>
+              </a:ext>
+            </a:extLst>
+          </p:cNvPr>
+          <p:cNvSpPr txBox="1">
+            <a:spLocks/>
+          </p:cNvSpPr>
+          <p:nvPr/>
+        </p:nvSpPr>
+        <p:spPr>
+          <a:xfrm>
+            <a:off x="0" y="0"/>
+            <a:ext cx="3596640" cy="2387600"/>
+          </a:xfrm>
+          <a:prstGeom prst="rect">
+            <a:avLst/>
+          </a:prstGeom>
+        </p:spPr>
+        <p:txBody>
+          <a:bodyPr vert="horz" lIns="91440" tIns="45720" rIns="91440" bIns="45720" rtlCol="0" anchor="b">
+            <a:normAutofit fontScale="97500" lnSpcReduction="10000"/>
+          </a:bodyPr>
+          <a:lstStyle>
+            <a:lvl1pPr algn="ctr" defTabSz="914400" rtl="0" eaLnBrk="1" latinLnBrk="0" hangingPunct="1">
+              <a:lnSpc>
+                <a:spcPct val="90000"/>
+              </a:lnSpc>
+              <a:spcBef>
+                <a:spcPct val="0"/>
+              </a:spcBef>
+              <a:buNone/>
+              <a:defRPr sz="6000" kern="1200">
+                <a:solidFill>
+                  <a:schemeClr val="tx1"/>
+                </a:solidFill>
+                <a:latin typeface="+mj-lt"/>
+                <a:ea typeface="+mj-ea"/>
+                <a:cs typeface="+mj-cs"/>
+              </a:defRPr>
+            </a:lvl1pPr>
+          </a:lstStyle>
+          <a:p>
+            <a:pPr algn="l"/>
+            <a:r>
+              <a:rPr lang="en-US" dirty="0">
+                <a:solidFill>
+                  <a:schemeClr val="bg1"/>
+                </a:solidFill>
+                <a:latin typeface="Franklin Gothic Demi" panose="020B0703020102020204" pitchFamily="34" charset="0"/>
+              </a:rPr>
+              <a:t>PRANAV</a:t>
+            </a:r>
+            <a:br>
+              <a:rPr lang="en-US" dirty="0">
+                <a:solidFill>
+                  <a:schemeClr val="bg1"/>
+                </a:solidFill>
+                <a:latin typeface="Franklin Gothic Demi" panose="020B0703020102020204" pitchFamily="34" charset="0"/>
+              </a:rPr>
+            </a:br>
+            <a:r>
+              <a:rPr lang="en-US" dirty="0">
+                <a:solidFill>
+                  <a:schemeClr val="bg1"/>
+                </a:solidFill>
+                <a:latin typeface="Franklin Gothic Demi" panose="020B0703020102020204" pitchFamily="34" charset="0"/>
+              </a:rPr>
+              <a:t>PRATAP</a:t>
+            </a:r>
+            <a:br>
+              <a:rPr lang="en-US" dirty="0">
+                <a:solidFill>
+                  <a:schemeClr val="bg1"/>
+                </a:solidFill>
+                <a:latin typeface="Franklin Gothic Demi" panose="020B0703020102020204" pitchFamily="34" charset="0"/>
+              </a:rPr>
+            </a:br>
+            <a:r>
+              <a:rPr lang="en-US" dirty="0">
+                <a:solidFill>
+                  <a:schemeClr val="bg1"/>
+                </a:solidFill>
+                <a:latin typeface="Franklin Gothic Demi" panose="020B0703020102020204" pitchFamily="34" charset="0"/>
+              </a:rPr>
+              <a:t>VAISH</a:t>
+            </a:r>
+          </a:p>
+        </p:txBody>
+      </p:sp>
+      <p:sp>
+        <p:nvSpPr>
+          <p:cNvPr id="7" name="Title 1">
+            <a:extLst>
+              <a:ext uri="{FF2B5EF4-FFF2-40B4-BE49-F238E27FC236}">
+                <a16:creationId xmlns:a16="http://schemas.microsoft.com/office/drawing/2014/main" id="{245D0490-E0D0-1045-9729-4666A14CD0B6}"/>
+              </a:ext>
+            </a:extLst>
+          </p:cNvPr>
+          <p:cNvSpPr txBox="1">
+            <a:spLocks/>
+          </p:cNvSpPr>
+          <p:nvPr/>
+        </p:nvSpPr>
+        <p:spPr>
+          <a:xfrm>
+            <a:off x="3393251" y="-2805"/>
+            <a:ext cx="2423686" cy="1110593"/>
+          </a:xfrm>
+          <a:prstGeom prst="rect">
+            <a:avLst/>
+          </a:prstGeom>
+        </p:spPr>
+        <p:txBody>
+          <a:bodyPr vert="horz" lIns="91440" tIns="45720" rIns="91440" bIns="45720" rtlCol="0" anchor="ctr">
+            <a:normAutofit fontScale="97500"/>
+          </a:bodyPr>
+          <a:lstStyle>
+            <a:lvl1pPr algn="ctr" defTabSz="914400" rtl="0" eaLnBrk="1" latinLnBrk="0" hangingPunct="1">
+              <a:lnSpc>
+                <a:spcPct val="90000"/>
+              </a:lnSpc>
+              <a:spcBef>
+                <a:spcPct val="0"/>
+              </a:spcBef>
+              <a:buNone/>
+              <a:defRPr sz="6000" kern="1200">
+                <a:solidFill>
+                  <a:schemeClr val="tx1"/>
+                </a:solidFill>
+                <a:latin typeface="+mj-lt"/>
+                <a:ea typeface="+mj-ea"/>
+                <a:cs typeface="+mj-cs"/>
+              </a:defRPr>
+            </a:lvl1pPr>
+          </a:lstStyle>
+          <a:p>
+            <a:r>
+              <a:rPr lang="en-US" dirty="0">
+                <a:solidFill>
+                  <a:schemeClr val="bg1"/>
+                </a:solidFill>
+                <a:latin typeface="Franklin Gothic Demi" panose="020B0703020102020204" pitchFamily="34" charset="0"/>
+              </a:rPr>
+              <a:t>about</a:t>
+            </a:r>
+          </a:p>
+        </p:txBody>
+      </p:sp>
+      <p:sp>
+        <p:nvSpPr>
+          <p:cNvPr id="8" name="Title 1">
+            <a:extLst>
+              <a:ext uri="{FF2B5EF4-FFF2-40B4-BE49-F238E27FC236}">
+                <a16:creationId xmlns:a16="http://schemas.microsoft.com/office/drawing/2014/main" id="{B2A03E50-21CF-3E43-B333-75C6B943C56F}"/>
+              </a:ext>
+            </a:extLst>
+          </p:cNvPr>
+          <p:cNvSpPr txBox="1">
+            <a:spLocks/>
+          </p:cNvSpPr>
+          <p:nvPr/>
+        </p:nvSpPr>
+        <p:spPr>
+          <a:xfrm>
+            <a:off x="6341432" y="-5610"/>
+            <a:ext cx="2423686" cy="1110593"/>
+          </a:xfrm>
+          <a:prstGeom prst="rect">
+            <a:avLst/>
+          </a:prstGeom>
+        </p:spPr>
+        <p:txBody>
+          <a:bodyPr vert="horz" lIns="91440" tIns="45720" rIns="91440" bIns="45720" rtlCol="0" anchor="ctr">
+            <a:normAutofit fontScale="97500"/>
+          </a:bodyPr>
+          <a:lstStyle>
+            <a:lvl1pPr algn="ctr" defTabSz="914400" rtl="0" eaLnBrk="1" latinLnBrk="0" hangingPunct="1">
+              <a:lnSpc>
+                <a:spcPct val="90000"/>
+              </a:lnSpc>
+              <a:spcBef>
+                <a:spcPct val="0"/>
+              </a:spcBef>
+              <a:buNone/>
+              <a:defRPr sz="6000" kern="1200">
+                <a:solidFill>
+                  <a:schemeClr val="tx1"/>
+                </a:solidFill>
+                <a:latin typeface="+mj-lt"/>
+                <a:ea typeface="+mj-ea"/>
+                <a:cs typeface="+mj-cs"/>
+              </a:defRPr>
+            </a:lvl1pPr>
+          </a:lstStyle>
+          <a:p>
+            <a:r>
+              <a:rPr lang="en-US" dirty="0">
+                <a:solidFill>
+                  <a:schemeClr val="bg1"/>
+                </a:solidFill>
+                <a:latin typeface="Franklin Gothic Demi" panose="020B0703020102020204" pitchFamily="34" charset="0"/>
+              </a:rPr>
+              <a:t>gallery</a:t>
+            </a:r>
+          </a:p>
+        </p:txBody>
+      </p:sp>
+      <p:sp>
+        <p:nvSpPr>
+          <p:cNvPr id="9" name="Title 1">
+            <a:extLst>
+              <a:ext uri="{FF2B5EF4-FFF2-40B4-BE49-F238E27FC236}">
+                <a16:creationId xmlns:a16="http://schemas.microsoft.com/office/drawing/2014/main" id="{8E1543EC-CB19-3B48-9A1A-0BBDEB138F40}"/>
+              </a:ext>
+            </a:extLst>
+          </p:cNvPr>
+          <p:cNvSpPr txBox="1">
+            <a:spLocks/>
+          </p:cNvSpPr>
+          <p:nvPr/>
+        </p:nvSpPr>
+        <p:spPr>
+          <a:xfrm>
+            <a:off x="9210188" y="0"/>
+            <a:ext cx="2791022" cy="1110593"/>
+          </a:xfrm>
+          <a:prstGeom prst="rect">
+            <a:avLst/>
+          </a:prstGeom>
+        </p:spPr>
+        <p:txBody>
+          <a:bodyPr vert="horz" lIns="91440" tIns="45720" rIns="91440" bIns="45720" rtlCol="0" anchor="ctr">
+            <a:normAutofit fontScale="97500"/>
+          </a:bodyPr>
+          <a:lstStyle>
+            <a:lvl1pPr algn="ctr" defTabSz="914400" rtl="0" eaLnBrk="1" latinLnBrk="0" hangingPunct="1">
+              <a:lnSpc>
+                <a:spcPct val="90000"/>
+              </a:lnSpc>
+              <a:spcBef>
+                <a:spcPct val="0"/>
+              </a:spcBef>
+              <a:buNone/>
+              <a:defRPr sz="6000" kern="1200">
+                <a:solidFill>
+                  <a:schemeClr val="tx1"/>
+                </a:solidFill>
+                <a:latin typeface="+mj-lt"/>
+                <a:ea typeface="+mj-ea"/>
+                <a:cs typeface="+mj-cs"/>
+              </a:defRPr>
+            </a:lvl1pPr>
+          </a:lstStyle>
+          <a:p>
+            <a:r>
+              <a:rPr lang="en-US" dirty="0">
+                <a:solidFill>
+                  <a:schemeClr val="bg1"/>
+                </a:solidFill>
+                <a:latin typeface="Franklin Gothic Demi" panose="020B0703020102020204" pitchFamily="34" charset="0"/>
+              </a:rPr>
+              <a:t>contact</a:t>
+            </a:r>
+          </a:p>
+        </p:txBody>
+      </p:sp>
+    </p:spTree>
+    <p:extLst>
+      <p:ext uri="{BB962C8B-B14F-4D97-AF65-F5344CB8AC3E}">
+        <p14:creationId xmlns:p14="http://schemas.microsoft.com/office/powerpoint/2010/main" val="1038548436"/>
+      </p:ext>
+    </p:extLst>
+  </p:cSld>
+  <p:clrMapOvr>
+    <a:masterClrMapping/>
+  </p:clrMapOvr>
+</p:sld>
+</file>
+
+<file path=ppt/slides/slide8.xml><?xml version="1.0" encoding="utf-8"?>
+<p:sld xmlns:a="http://schemas.openxmlformats.org/drawingml/2006/main" xmlns:r="http://schemas.openxmlformats.org/officeDocument/2006/relationships" xmlns:p="http://schemas.openxmlformats.org/presentationml/2006/main">
+  <p:cSld>
+    <p:bg>
+      <p:bgPr>
+        <a:solidFill>
+          <a:srgbClr val="F3E2D3"/>
+        </a:solidFill>
+        <a:effectLst/>
+      </p:bgPr>
+    </p:bg>
+    <p:spTree>
+      <p:nvGrpSpPr>
+        <p:cNvPr id="1" name=""/>
+        <p:cNvGrpSpPr/>
+        <p:nvPr/>
+      </p:nvGrpSpPr>
+      <p:grpSpPr>
+        <a:xfrm>
+          <a:off x="0" y="0"/>
+          <a:ext cx="0" cy="0"/>
+          <a:chOff x="0" y="0"/>
+          <a:chExt cx="0" cy="0"/>
+        </a:xfrm>
+      </p:grpSpPr>
+      <p:sp>
+        <p:nvSpPr>
+          <p:cNvPr id="2" name="Rectangle 1">
+            <a:extLst>
+              <a:ext uri="{FF2B5EF4-FFF2-40B4-BE49-F238E27FC236}">
+                <a16:creationId xmlns:a16="http://schemas.microsoft.com/office/drawing/2014/main" id="{78EE58B7-24EE-C142-A867-C99C821E00C3}"/>
+              </a:ext>
+            </a:extLst>
+          </p:cNvPr>
+          <p:cNvSpPr/>
+          <p:nvPr/>
+        </p:nvSpPr>
+        <p:spPr>
+          <a:xfrm>
+            <a:off x="0" y="7002936"/>
+            <a:ext cx="12192000" cy="3752193"/>
+          </a:xfrm>
+          <a:prstGeom prst="rect">
+            <a:avLst/>
+          </a:prstGeom>
+        </p:spPr>
+        <p:style>
+          <a:lnRef idx="2">
+            <a:schemeClr val="dk1">
+              <a:shade val="50000"/>
+            </a:schemeClr>
+          </a:lnRef>
+          <a:fillRef idx="1">
+            <a:schemeClr val="dk1"/>
+          </a:fillRef>
+          <a:effectRef idx="0">
+            <a:schemeClr val="dk1"/>
+          </a:effectRef>
+          <a:fontRef idx="minor">
+            <a:schemeClr val="lt1"/>
+          </a:fontRef>
+        </p:style>
+        <p:txBody>
+          <a:bodyPr rtlCol="0" anchor="ctr"/>
+          <a:lstStyle/>
+          <a:p>
+            <a:pPr algn="ctr"/>
+            <a:endParaRPr lang="en-US"/>
+          </a:p>
+        </p:txBody>
+      </p:sp>
+      <p:pic>
+        <p:nvPicPr>
+          <p:cNvPr id="5" name="Picture 4">
+            <a:extLst>
+              <a:ext uri="{FF2B5EF4-FFF2-40B4-BE49-F238E27FC236}">
+                <a16:creationId xmlns:a16="http://schemas.microsoft.com/office/drawing/2014/main" id="{8313CEFD-B8E1-4BDA-AA87-16C8D9B228F6}"/>
+              </a:ext>
+            </a:extLst>
+          </p:cNvPr>
+          <p:cNvPicPr>
+            <a:picLocks noChangeAspect="1"/>
+          </p:cNvPicPr>
+          <p:nvPr/>
+        </p:nvPicPr>
+        <p:blipFill rotWithShape="1">
+          <a:blip r:embed="rId2">
+            <a:extLst>
+              <a:ext uri="{28A0092B-C50C-407E-A947-70E740481C1C}">
+                <a14:useLocalDpi xmlns:a14="http://schemas.microsoft.com/office/drawing/2010/main" val="0"/>
+              </a:ext>
+            </a:extLst>
+          </a:blip>
+          <a:srcRect t="11282" b="6257"/>
+          <a:stretch/>
+        </p:blipFill>
+        <p:spPr>
+          <a:xfrm>
+            <a:off x="0" y="0"/>
+            <a:ext cx="12192000" cy="7540284"/>
+          </a:xfrm>
+          <a:prstGeom prst="rect">
+            <a:avLst/>
+          </a:prstGeom>
+        </p:spPr>
+      </p:pic>
+      <p:sp>
+        <p:nvSpPr>
+          <p:cNvPr id="6" name="Title 1">
+            <a:extLst>
+              <a:ext uri="{FF2B5EF4-FFF2-40B4-BE49-F238E27FC236}">
+                <a16:creationId xmlns:a16="http://schemas.microsoft.com/office/drawing/2014/main" id="{B72C96C0-0346-C442-8A78-66C1D10474C3}"/>
+              </a:ext>
+            </a:extLst>
+          </p:cNvPr>
+          <p:cNvSpPr txBox="1">
+            <a:spLocks/>
+          </p:cNvSpPr>
+          <p:nvPr/>
+        </p:nvSpPr>
+        <p:spPr>
+          <a:xfrm>
+            <a:off x="0" y="0"/>
+            <a:ext cx="3596640" cy="2387600"/>
+          </a:xfrm>
+          <a:prstGeom prst="rect">
+            <a:avLst/>
+          </a:prstGeom>
+        </p:spPr>
+        <p:txBody>
+          <a:bodyPr vert="horz" lIns="91440" tIns="45720" rIns="91440" bIns="45720" rtlCol="0" anchor="b">
+            <a:normAutofit fontScale="97500" lnSpcReduction="10000"/>
+          </a:bodyPr>
+          <a:lstStyle>
+            <a:lvl1pPr algn="ctr" defTabSz="914400" rtl="0" eaLnBrk="1" latinLnBrk="0" hangingPunct="1">
+              <a:lnSpc>
+                <a:spcPct val="90000"/>
+              </a:lnSpc>
+              <a:spcBef>
+                <a:spcPct val="0"/>
+              </a:spcBef>
+              <a:buNone/>
+              <a:defRPr sz="6000" kern="1200">
+                <a:solidFill>
+                  <a:schemeClr val="tx1"/>
+                </a:solidFill>
+                <a:latin typeface="+mj-lt"/>
+                <a:ea typeface="+mj-ea"/>
+                <a:cs typeface="+mj-cs"/>
+              </a:defRPr>
+            </a:lvl1pPr>
+          </a:lstStyle>
+          <a:p>
+            <a:pPr algn="l"/>
+            <a:r>
+              <a:rPr lang="en-US" dirty="0">
+                <a:latin typeface="Franklin Gothic Demi" panose="020B0703020102020204" pitchFamily="34" charset="0"/>
+              </a:rPr>
+              <a:t>PRANAV</a:t>
+            </a:r>
+            <a:br>
+              <a:rPr lang="en-US" dirty="0">
+                <a:latin typeface="Franklin Gothic Demi" panose="020B0703020102020204" pitchFamily="34" charset="0"/>
+              </a:rPr>
+            </a:br>
+            <a:r>
+              <a:rPr lang="en-US" dirty="0">
+                <a:latin typeface="Franklin Gothic Demi" panose="020B0703020102020204" pitchFamily="34" charset="0"/>
+              </a:rPr>
+              <a:t>PRATAP</a:t>
+            </a:r>
+            <a:br>
+              <a:rPr lang="en-US" dirty="0">
+                <a:latin typeface="Franklin Gothic Demi" panose="020B0703020102020204" pitchFamily="34" charset="0"/>
+              </a:rPr>
+            </a:br>
+            <a:r>
+              <a:rPr lang="en-US" dirty="0">
+                <a:latin typeface="Franklin Gothic Demi" panose="020B0703020102020204" pitchFamily="34" charset="0"/>
+              </a:rPr>
+              <a:t>VAISH</a:t>
+            </a:r>
+          </a:p>
+        </p:txBody>
+      </p:sp>
+      <p:sp>
+        <p:nvSpPr>
+          <p:cNvPr id="7" name="Title 1">
+            <a:extLst>
+              <a:ext uri="{FF2B5EF4-FFF2-40B4-BE49-F238E27FC236}">
+                <a16:creationId xmlns:a16="http://schemas.microsoft.com/office/drawing/2014/main" id="{245D0490-E0D0-1045-9729-4666A14CD0B6}"/>
+              </a:ext>
+            </a:extLst>
+          </p:cNvPr>
+          <p:cNvSpPr txBox="1">
+            <a:spLocks/>
+          </p:cNvSpPr>
+          <p:nvPr/>
+        </p:nvSpPr>
+        <p:spPr>
+          <a:xfrm>
+            <a:off x="3393251" y="-2805"/>
+            <a:ext cx="2423686" cy="1110593"/>
+          </a:xfrm>
+          <a:prstGeom prst="rect">
+            <a:avLst/>
+          </a:prstGeom>
+        </p:spPr>
+        <p:txBody>
+          <a:bodyPr vert="horz" lIns="91440" tIns="45720" rIns="91440" bIns="45720" rtlCol="0" anchor="ctr">
+            <a:normAutofit fontScale="97500"/>
+          </a:bodyPr>
+          <a:lstStyle>
+            <a:lvl1pPr algn="ctr" defTabSz="914400" rtl="0" eaLnBrk="1" latinLnBrk="0" hangingPunct="1">
+              <a:lnSpc>
+                <a:spcPct val="90000"/>
+              </a:lnSpc>
+              <a:spcBef>
+                <a:spcPct val="0"/>
+              </a:spcBef>
+              <a:buNone/>
+              <a:defRPr sz="6000" kern="1200">
+                <a:solidFill>
+                  <a:schemeClr val="tx1"/>
+                </a:solidFill>
+                <a:latin typeface="+mj-lt"/>
+                <a:ea typeface="+mj-ea"/>
+                <a:cs typeface="+mj-cs"/>
+              </a:defRPr>
+            </a:lvl1pPr>
+          </a:lstStyle>
+          <a:p>
+            <a:r>
+              <a:rPr lang="en-US" sz="5400" dirty="0">
+                <a:latin typeface="Franklin Gothic Demi" panose="020B0703020102020204" pitchFamily="34" charset="0"/>
+              </a:rPr>
+              <a:t>about</a:t>
+            </a:r>
+          </a:p>
+        </p:txBody>
+      </p:sp>
+      <p:sp>
+        <p:nvSpPr>
+          <p:cNvPr id="8" name="Title 1">
+            <a:extLst>
+              <a:ext uri="{FF2B5EF4-FFF2-40B4-BE49-F238E27FC236}">
+                <a16:creationId xmlns:a16="http://schemas.microsoft.com/office/drawing/2014/main" id="{B2A03E50-21CF-3E43-B333-75C6B943C56F}"/>
+              </a:ext>
+            </a:extLst>
+          </p:cNvPr>
+          <p:cNvSpPr txBox="1">
+            <a:spLocks/>
+          </p:cNvSpPr>
+          <p:nvPr/>
+        </p:nvSpPr>
+        <p:spPr>
+          <a:xfrm>
+            <a:off x="6341432" y="-5610"/>
+            <a:ext cx="2423686" cy="1110593"/>
+          </a:xfrm>
+          <a:prstGeom prst="rect">
+            <a:avLst/>
+          </a:prstGeom>
+        </p:spPr>
+        <p:txBody>
+          <a:bodyPr vert="horz" lIns="91440" tIns="45720" rIns="91440" bIns="45720" rtlCol="0" anchor="ctr">
+            <a:normAutofit fontScale="97500"/>
+          </a:bodyPr>
+          <a:lstStyle>
+            <a:lvl1pPr algn="ctr" defTabSz="914400" rtl="0" eaLnBrk="1" latinLnBrk="0" hangingPunct="1">
+              <a:lnSpc>
+                <a:spcPct val="90000"/>
+              </a:lnSpc>
+              <a:spcBef>
+                <a:spcPct val="0"/>
+              </a:spcBef>
+              <a:buNone/>
+              <a:defRPr sz="6000" kern="1200">
+                <a:solidFill>
+                  <a:schemeClr val="tx1"/>
+                </a:solidFill>
+                <a:latin typeface="+mj-lt"/>
+                <a:ea typeface="+mj-ea"/>
+                <a:cs typeface="+mj-cs"/>
+              </a:defRPr>
+            </a:lvl1pPr>
+          </a:lstStyle>
+          <a:p>
+            <a:r>
+              <a:rPr lang="en-US" sz="5400" dirty="0">
+                <a:latin typeface="Franklin Gothic Demi" panose="020B0703020102020204" pitchFamily="34" charset="0"/>
+              </a:rPr>
+              <a:t>gallery</a:t>
+            </a:r>
+          </a:p>
+        </p:txBody>
+      </p:sp>
+      <p:sp>
+        <p:nvSpPr>
+          <p:cNvPr id="9" name="Title 1">
+            <a:extLst>
+              <a:ext uri="{FF2B5EF4-FFF2-40B4-BE49-F238E27FC236}">
+                <a16:creationId xmlns:a16="http://schemas.microsoft.com/office/drawing/2014/main" id="{8E1543EC-CB19-3B48-9A1A-0BBDEB138F40}"/>
+              </a:ext>
+            </a:extLst>
+          </p:cNvPr>
+          <p:cNvSpPr txBox="1">
+            <a:spLocks/>
+          </p:cNvSpPr>
+          <p:nvPr/>
+        </p:nvSpPr>
+        <p:spPr>
+          <a:xfrm>
+            <a:off x="9210188" y="0"/>
+            <a:ext cx="2791022" cy="1110593"/>
+          </a:xfrm>
+          <a:prstGeom prst="rect">
+            <a:avLst/>
+          </a:prstGeom>
+        </p:spPr>
+        <p:txBody>
+          <a:bodyPr vert="horz" lIns="91440" tIns="45720" rIns="91440" bIns="45720" rtlCol="0" anchor="ctr">
+            <a:normAutofit fontScale="97500"/>
+          </a:bodyPr>
+          <a:lstStyle>
+            <a:lvl1pPr algn="ctr" defTabSz="914400" rtl="0" eaLnBrk="1" latinLnBrk="0" hangingPunct="1">
+              <a:lnSpc>
+                <a:spcPct val="90000"/>
+              </a:lnSpc>
+              <a:spcBef>
+                <a:spcPct val="0"/>
+              </a:spcBef>
+              <a:buNone/>
+              <a:defRPr sz="6000" kern="1200">
+                <a:solidFill>
+                  <a:schemeClr val="tx1"/>
+                </a:solidFill>
+                <a:latin typeface="+mj-lt"/>
+                <a:ea typeface="+mj-ea"/>
+                <a:cs typeface="+mj-cs"/>
+              </a:defRPr>
+            </a:lvl1pPr>
+          </a:lstStyle>
+          <a:p>
+            <a:r>
+              <a:rPr lang="en-US" sz="5400" dirty="0">
+                <a:latin typeface="Franklin Gothic Demi" panose="020B0703020102020204" pitchFamily="34" charset="0"/>
+              </a:rPr>
+              <a:t>contact</a:t>
+            </a:r>
+          </a:p>
+        </p:txBody>
+      </p:sp>
+    </p:spTree>
+    <p:extLst>
+      <p:ext uri="{BB962C8B-B14F-4D97-AF65-F5344CB8AC3E}">
+        <p14:creationId xmlns:p14="http://schemas.microsoft.com/office/powerpoint/2010/main" val="3994116942"/>
+      </p:ext>
+    </p:extLst>
+  </p:cSld>
+  <p:clrMapOvr>
+    <a:masterClrMapping/>
+  </p:clrMapOvr>
+</p:sld>
+</file>
+
 <file path=ppt/theme/theme1.xml><?xml version="1.0" encoding="utf-8"?>
 <a:theme xmlns:a="http://schemas.openxmlformats.org/drawingml/2006/main" name="Office Theme">
   <a:themeElements>

</xml_diff>